<commit_message>
Presentation & Documentation Update
</commit_message>
<xml_diff>
--- a/Präsentation.pptx
+++ b/Präsentation.pptx
@@ -5,31 +5,34 @@
     <p:sldMasterId id="2147483660" r:id="rId1"/>
   </p:sldMasterIdLst>
   <p:notesMasterIdLst>
-    <p:notesMasterId r:id="rId17"/>
+    <p:notesMasterId r:id="rId16"/>
   </p:notesMasterIdLst>
   <p:handoutMasterIdLst>
-    <p:handoutMasterId r:id="rId18"/>
+    <p:handoutMasterId r:id="rId17"/>
   </p:handoutMasterIdLst>
   <p:sldIdLst>
     <p:sldId id="340" r:id="rId2"/>
     <p:sldId id="344" r:id="rId3"/>
-    <p:sldId id="352" r:id="rId4"/>
-    <p:sldId id="284" r:id="rId5"/>
-    <p:sldId id="353" r:id="rId6"/>
-    <p:sldId id="325" r:id="rId7"/>
-    <p:sldId id="354" r:id="rId8"/>
-    <p:sldId id="286" r:id="rId9"/>
-    <p:sldId id="285" r:id="rId10"/>
-    <p:sldId id="291" r:id="rId11"/>
-    <p:sldId id="287" r:id="rId12"/>
-    <p:sldId id="310" r:id="rId13"/>
-    <p:sldId id="265" r:id="rId14"/>
-    <p:sldId id="339" r:id="rId15"/>
-    <p:sldId id="346" r:id="rId16"/>
+    <p:sldId id="284" r:id="rId4"/>
+    <p:sldId id="353" r:id="rId5"/>
+    <p:sldId id="325" r:id="rId6"/>
+    <p:sldId id="354" r:id="rId7"/>
+    <p:sldId id="285" r:id="rId8"/>
+    <p:sldId id="291" r:id="rId9"/>
+    <p:sldId id="287" r:id="rId10"/>
+    <p:sldId id="310" r:id="rId11"/>
+    <p:sldId id="355" r:id="rId12"/>
+    <p:sldId id="265" r:id="rId13"/>
+    <p:sldId id="339" r:id="rId14"/>
+    <p:sldId id="346" r:id="rId15"/>
   </p:sldIdLst>
   <p:sldSz cx="12195175" cy="6859588"/>
   <p:notesSz cx="6797675" cy="9874250"/>
   <p:embeddedFontLst>
+    <p:embeddedFont>
+      <p:font typeface="Arial Unicode MS" panose="020B0604020202020204" pitchFamily="34" charset="-128"/>
+      <p:regular r:id="rId18"/>
+    </p:embeddedFont>
     <p:embeddedFont>
       <p:font typeface="Consolas" panose="020B0609020204030204" pitchFamily="49" charset="0"/>
       <p:regular r:id="rId19"/>
@@ -40,10 +43,6 @@
     <p:embeddedFont>
       <p:font typeface="MS PGothic" panose="020B0604020202020204" charset="-128"/>
       <p:regular r:id="rId23"/>
-    </p:embeddedFont>
-    <p:embeddedFont>
-      <p:font typeface="Arial Unicode MS" panose="020B0604020202020204" pitchFamily="34" charset="-128"/>
-      <p:regular r:id="rId24"/>
     </p:embeddedFont>
   </p:embeddedFontLst>
   <p:defaultTextStyle>
@@ -729,14 +728,14 @@
           <a:bodyPr/>
           <a:lstStyle/>
           <a:p>
-            <a:endParaRPr lang="en-US"/>
+            <a:endParaRPr lang="en-US" dirty="0"/>
           </a:p>
         </p:txBody>
       </p:sp>
     </p:spTree>
     <p:extLst>
       <p:ext uri="{BB962C8B-B14F-4D97-AF65-F5344CB8AC3E}">
-        <p14:creationId xmlns:p14="http://schemas.microsoft.com/office/powerpoint/2010/main" val="1864417997"/>
+        <p14:creationId xmlns:p14="http://schemas.microsoft.com/office/powerpoint/2010/main" val="2400490074"/>
       </p:ext>
     </p:extLst>
   </p:cSld>
@@ -821,7 +820,7 @@
     </p:spTree>
     <p:extLst>
       <p:ext uri="{BB962C8B-B14F-4D97-AF65-F5344CB8AC3E}">
-        <p14:creationId xmlns:p14="http://schemas.microsoft.com/office/powerpoint/2010/main" val="4236289013"/>
+        <p14:creationId xmlns:p14="http://schemas.microsoft.com/office/powerpoint/2010/main" val="2309943681"/>
       </p:ext>
     </p:extLst>
   </p:cSld>
@@ -899,14 +898,14 @@
           <a:bodyPr/>
           <a:lstStyle/>
           <a:p>
-            <a:endParaRPr lang="en-US" dirty="0"/>
+            <a:endParaRPr lang="en-US"/>
           </a:p>
         </p:txBody>
       </p:sp>
     </p:spTree>
     <p:extLst>
       <p:ext uri="{BB962C8B-B14F-4D97-AF65-F5344CB8AC3E}">
-        <p14:creationId xmlns:p14="http://schemas.microsoft.com/office/powerpoint/2010/main" val="2400490074"/>
+        <p14:creationId xmlns:p14="http://schemas.microsoft.com/office/powerpoint/2010/main" val="3036394954"/>
       </p:ext>
     </p:extLst>
   </p:cSld>
@@ -991,7 +990,7 @@
     </p:spTree>
     <p:extLst>
       <p:ext uri="{BB962C8B-B14F-4D97-AF65-F5344CB8AC3E}">
-        <p14:creationId xmlns:p14="http://schemas.microsoft.com/office/powerpoint/2010/main" val="3036394954"/>
+        <p14:creationId xmlns:p14="http://schemas.microsoft.com/office/powerpoint/2010/main" val="2596342764"/>
       </p:ext>
     </p:extLst>
   </p:cSld>
@@ -1037,91 +1036,6 @@
               <a:rPr lang="en-US" smtClean="0"/>
               <a:pPr/>
               <a:t>14</a:t>
-            </a:fld>
-            <a:endParaRPr lang="en-US" dirty="0"/>
-          </a:p>
-        </p:txBody>
-      </p:sp>
-      <p:sp>
-        <p:nvSpPr>
-          <p:cNvPr id="3" name="Slide Image Placeholder 2"/>
-          <p:cNvSpPr>
-            <a:spLocks noGrp="1" noRot="1" noChangeAspect="1"/>
-          </p:cNvSpPr>
-          <p:nvPr>
-            <p:ph type="sldImg"/>
-          </p:nvPr>
-        </p:nvSpPr>
-        <p:spPr/>
-      </p:sp>
-      <p:sp>
-        <p:nvSpPr>
-          <p:cNvPr id="5" name="Notes Placeholder 4"/>
-          <p:cNvSpPr>
-            <a:spLocks noGrp="1"/>
-          </p:cNvSpPr>
-          <p:nvPr>
-            <p:ph type="body" idx="1"/>
-          </p:nvPr>
-        </p:nvSpPr>
-        <p:spPr/>
-        <p:txBody>
-          <a:bodyPr/>
-          <a:lstStyle/>
-          <a:p>
-            <a:endParaRPr lang="en-US"/>
-          </a:p>
-        </p:txBody>
-      </p:sp>
-    </p:spTree>
-    <p:extLst>
-      <p:ext uri="{BB962C8B-B14F-4D97-AF65-F5344CB8AC3E}">
-        <p14:creationId xmlns:p14="http://schemas.microsoft.com/office/powerpoint/2010/main" val="2596342764"/>
-      </p:ext>
-    </p:extLst>
-  </p:cSld>
-  <p:clrMapOvr>
-    <a:masterClrMapping/>
-  </p:clrMapOvr>
-</p:notes>
-</file>
-
-<file path=ppt/notesSlides/notesSlide15.xml><?xml version="1.0" encoding="utf-8"?>
-<p:notes xmlns:a="http://schemas.openxmlformats.org/drawingml/2006/main" xmlns:r="http://schemas.openxmlformats.org/officeDocument/2006/relationships" xmlns:p="http://schemas.openxmlformats.org/presentationml/2006/main">
-  <p:cSld>
-    <p:spTree>
-      <p:nvGrpSpPr>
-        <p:cNvPr id="1" name=""/>
-        <p:cNvGrpSpPr/>
-        <p:nvPr/>
-      </p:nvGrpSpPr>
-      <p:grpSpPr>
-        <a:xfrm>
-          <a:off x="0" y="0"/>
-          <a:ext cx="0" cy="0"/>
-          <a:chOff x="0" y="0"/>
-          <a:chExt cx="0" cy="0"/>
-        </a:xfrm>
-      </p:grpSpPr>
-      <p:sp>
-        <p:nvSpPr>
-          <p:cNvPr id="4" name="Slide Number Placeholder 3"/>
-          <p:cNvSpPr>
-            <a:spLocks noGrp="1"/>
-          </p:cNvSpPr>
-          <p:nvPr>
-            <p:ph type="sldNum" sz="quarter" idx="10"/>
-          </p:nvPr>
-        </p:nvSpPr>
-        <p:spPr/>
-        <p:txBody>
-          <a:bodyPr/>
-          <a:lstStyle/>
-          <a:p>
-            <a:fld id="{7D8C2C35-2B8A-446E-BEC0-FD36716C29AC}" type="slidenum">
-              <a:rPr lang="en-US" smtClean="0"/>
-              <a:pPr/>
-              <a:t>15</a:t>
             </a:fld>
             <a:endParaRPr lang="en-US" dirty="0"/>
           </a:p>
@@ -1289,11 +1203,11 @@
           <a:lstStyle/>
           <a:p>
             <a:fld id="{7D8C2C35-2B8A-446E-BEC0-FD36716C29AC}" type="slidenum">
-              <a:rPr lang="de-DE" smtClean="0"/>
+              <a:rPr lang="en-US" smtClean="0"/>
               <a:pPr/>
               <a:t>3</a:t>
             </a:fld>
-            <a:endParaRPr lang="de-DE" dirty="0"/>
+            <a:endParaRPr lang="en-US" dirty="0"/>
           </a:p>
         </p:txBody>
       </p:sp>
@@ -1331,7 +1245,7 @@
     </p:spTree>
     <p:extLst>
       <p:ext uri="{BB962C8B-B14F-4D97-AF65-F5344CB8AC3E}">
-        <p14:creationId xmlns:p14="http://schemas.microsoft.com/office/powerpoint/2010/main" val="2966340980"/>
+        <p14:creationId xmlns:p14="http://schemas.microsoft.com/office/powerpoint/2010/main" val="3728045286"/>
       </p:ext>
     </p:extLst>
   </p:cSld>
@@ -1409,14 +1323,14 @@
           <a:bodyPr/>
           <a:lstStyle/>
           <a:p>
-            <a:endParaRPr lang="en-US"/>
+            <a:endParaRPr lang="en-US" dirty="0"/>
           </a:p>
         </p:txBody>
       </p:sp>
     </p:spTree>
     <p:extLst>
       <p:ext uri="{BB962C8B-B14F-4D97-AF65-F5344CB8AC3E}">
-        <p14:creationId xmlns:p14="http://schemas.microsoft.com/office/powerpoint/2010/main" val="3728045286"/>
+        <p14:creationId xmlns:p14="http://schemas.microsoft.com/office/powerpoint/2010/main" val="3035010379"/>
       </p:ext>
     </p:extLst>
   </p:cSld>
@@ -1494,14 +1408,18 @@
           <a:bodyPr/>
           <a:lstStyle/>
           <a:p>
-            <a:endParaRPr lang="en-US"/>
+            <a:r>
+              <a:rPr lang="en-US" dirty="0" smtClean="0"/>
+              <a:t>MAX</a:t>
+            </a:r>
+            <a:endParaRPr lang="en-US" dirty="0"/>
           </a:p>
         </p:txBody>
       </p:sp>
     </p:spTree>
     <p:extLst>
       <p:ext uri="{BB962C8B-B14F-4D97-AF65-F5344CB8AC3E}">
-        <p14:creationId xmlns:p14="http://schemas.microsoft.com/office/powerpoint/2010/main" val="3035010379"/>
+        <p14:creationId xmlns:p14="http://schemas.microsoft.com/office/powerpoint/2010/main" val="1994061429"/>
       </p:ext>
     </p:extLst>
   </p:cSld>
@@ -1581,7 +1499,7 @@
           <a:p>
             <a:r>
               <a:rPr lang="en-US" dirty="0" smtClean="0"/>
-              <a:t>MAX</a:t>
+              <a:t>DOMINIC</a:t>
             </a:r>
             <a:endParaRPr lang="en-US" dirty="0"/>
           </a:p>
@@ -1590,7 +1508,7 @@
     </p:spTree>
     <p:extLst>
       <p:ext uri="{BB962C8B-B14F-4D97-AF65-F5344CB8AC3E}">
-        <p14:creationId xmlns:p14="http://schemas.microsoft.com/office/powerpoint/2010/main" val="1994061429"/>
+        <p14:creationId xmlns:p14="http://schemas.microsoft.com/office/powerpoint/2010/main" val="3005312253"/>
       </p:ext>
     </p:extLst>
   </p:cSld>
@@ -1668,18 +1586,14 @@
           <a:bodyPr/>
           <a:lstStyle/>
           <a:p>
-            <a:r>
-              <a:rPr lang="en-US" dirty="0" smtClean="0"/>
-              <a:t>DOMINIC</a:t>
-            </a:r>
-            <a:endParaRPr lang="en-US" dirty="0"/>
+            <a:endParaRPr lang="en-US"/>
           </a:p>
         </p:txBody>
       </p:sp>
     </p:spTree>
     <p:extLst>
       <p:ext uri="{BB962C8B-B14F-4D97-AF65-F5344CB8AC3E}">
-        <p14:creationId xmlns:p14="http://schemas.microsoft.com/office/powerpoint/2010/main" val="3005312253"/>
+        <p14:creationId xmlns:p14="http://schemas.microsoft.com/office/powerpoint/2010/main" val="3036079019"/>
       </p:ext>
     </p:extLst>
   </p:cSld>
@@ -1764,7 +1678,7 @@
     </p:spTree>
     <p:extLst>
       <p:ext uri="{BB962C8B-B14F-4D97-AF65-F5344CB8AC3E}">
-        <p14:creationId xmlns:p14="http://schemas.microsoft.com/office/powerpoint/2010/main" val="4289975715"/>
+        <p14:creationId xmlns:p14="http://schemas.microsoft.com/office/powerpoint/2010/main" val="1864417997"/>
       </p:ext>
     </p:extLst>
   </p:cSld>
@@ -1849,7 +1763,7 @@
     </p:spTree>
     <p:extLst>
       <p:ext uri="{BB962C8B-B14F-4D97-AF65-F5344CB8AC3E}">
-        <p14:creationId xmlns:p14="http://schemas.microsoft.com/office/powerpoint/2010/main" val="3036079019"/>
+        <p14:creationId xmlns:p14="http://schemas.microsoft.com/office/powerpoint/2010/main" val="4236289013"/>
       </p:ext>
     </p:extLst>
   </p:cSld>
@@ -8269,6 +8183,72 @@
 </file>
 
 <file path=ppt/slides/slide10.xml><?xml version="1.0" encoding="utf-8"?>
+<p:sld xmlns:a="http://schemas.openxmlformats.org/drawingml/2006/main" xmlns:r="http://schemas.openxmlformats.org/officeDocument/2006/relationships" xmlns:p="http://schemas.openxmlformats.org/presentationml/2006/main">
+  <p:cSld>
+    <p:spTree>
+      <p:nvGrpSpPr>
+        <p:cNvPr id="1" name=""/>
+        <p:cNvGrpSpPr/>
+        <p:nvPr/>
+      </p:nvGrpSpPr>
+      <p:grpSpPr>
+        <a:xfrm>
+          <a:off x="0" y="0"/>
+          <a:ext cx="0" cy="0"/>
+          <a:chOff x="0" y="0"/>
+          <a:chExt cx="0" cy="0"/>
+        </a:xfrm>
+      </p:grpSpPr>
+      <p:sp>
+        <p:nvSpPr>
+          <p:cNvPr id="5" name="Title 4"/>
+          <p:cNvSpPr>
+            <a:spLocks noGrp="1"/>
+          </p:cNvSpPr>
+          <p:nvPr>
+            <p:ph type="ctrTitle"/>
+          </p:nvPr>
+        </p:nvSpPr>
+        <p:spPr>
+          <a:xfrm>
+            <a:off x="324000" y="2968129"/>
+            <a:ext cx="11545200" cy="923330"/>
+          </a:xfrm>
+        </p:spPr>
+        <p:txBody>
+          <a:bodyPr/>
+          <a:lstStyle/>
+          <a:p>
+            <a:r>
+              <a:rPr lang="en-US" dirty="0" smtClean="0"/>
+              <a:t>Thank you </a:t>
+            </a:r>
+            <a:r>
+              <a:rPr lang="en-US" dirty="0" smtClean="0">
+                <a:sym typeface="Wingdings" panose="05000000000000000000" pitchFamily="2" charset="2"/>
+              </a:rPr>
+              <a:t></a:t>
+            </a:r>
+            <a:endParaRPr lang="en-US" dirty="0"/>
+          </a:p>
+        </p:txBody>
+      </p:sp>
+    </p:spTree>
+  </p:cSld>
+  <p:clrMapOvr>
+    <a:masterClrMapping/>
+  </p:clrMapOvr>
+  <p:timing>
+    <p:tnLst>
+      <p:par>
+        <p:cTn id="1" dur="indefinite" restart="never" nodeType="tmRoot"/>
+      </p:par>
+    </p:tnLst>
+  </p:timing>
+</p:sld>
+</file>
+
+<file path=ppt/slides/slide11.xml><?xml version="1.0" encoding="utf-8"?>
 <p:sld xmlns:a="http://schemas.openxmlformats.org/drawingml/2006/main" xmlns:r="http://schemas.openxmlformats.org/officeDocument/2006/relationships" xmlns:p="http://schemas.openxmlformats.org/presentationml/2006/main" show="0">
   <p:cSld>
     <p:spTree>
@@ -8301,118 +8281,18 @@
           <a:lstStyle/>
           <a:p>
             <a:r>
-              <a:rPr lang="en-US" dirty="0" smtClean="0"/>
-              <a:t>Insert page title </a:t>
+              <a:rPr lang="en-US" dirty="0" err="1" smtClean="0"/>
+              <a:t>Technische</a:t>
+            </a:r>
+            <a:r>
+              <a:rPr lang="en-US" dirty="0" smtClean="0"/>
+              <a:t> </a:t>
+            </a:r>
+            <a:r>
+              <a:rPr lang="en-US" dirty="0" err="1" smtClean="0"/>
+              <a:t>Mittel</a:t>
             </a:r>
             <a:endParaRPr lang="en-US" dirty="0"/>
-          </a:p>
-        </p:txBody>
-      </p:sp>
-      <p:sp>
-        <p:nvSpPr>
-          <p:cNvPr id="4" name="Text Placeholder 3"/>
-          <p:cNvSpPr>
-            <a:spLocks noGrp="1"/>
-          </p:cNvSpPr>
-          <p:nvPr>
-            <p:ph type="body" sz="quarter" idx="11"/>
-          </p:nvPr>
-        </p:nvSpPr>
-        <p:spPr/>
-        <p:txBody>
-          <a:bodyPr/>
-          <a:lstStyle/>
-          <a:p>
-            <a:pPr lvl="0"/>
-            <a:r>
-              <a:rPr lang="en-US" dirty="0" smtClean="0"/>
-              <a:t>First level</a:t>
-            </a:r>
-          </a:p>
-          <a:p>
-            <a:pPr lvl="1"/>
-            <a:r>
-              <a:rPr lang="en-US" dirty="0" smtClean="0"/>
-              <a:t>Second level</a:t>
-            </a:r>
-          </a:p>
-          <a:p>
-            <a:pPr lvl="2"/>
-            <a:r>
-              <a:rPr lang="en-US" dirty="0" smtClean="0"/>
-              <a:t>Third level</a:t>
-            </a:r>
-          </a:p>
-          <a:p>
-            <a:endParaRPr lang="en-US" dirty="0"/>
-          </a:p>
-        </p:txBody>
-      </p:sp>
-      <p:sp>
-        <p:nvSpPr>
-          <p:cNvPr id="5" name="Picture Placeholder 4"/>
-          <p:cNvSpPr>
-            <a:spLocks noGrp="1"/>
-          </p:cNvSpPr>
-          <p:nvPr>
-            <p:ph type="pic" sz="quarter" idx="10"/>
-          </p:nvPr>
-        </p:nvSpPr>
-        <p:spPr/>
-      </p:sp>
-    </p:spTree>
-  </p:cSld>
-  <p:clrMapOvr>
-    <a:masterClrMapping/>
-  </p:clrMapOvr>
-  <p:transition spd="med"/>
-  <p:timing>
-    <p:tnLst>
-      <p:par>
-        <p:cTn id="1" dur="indefinite" restart="never" nodeType="tmRoot"/>
-      </p:par>
-    </p:tnLst>
-  </p:timing>
-</p:sld>
-</file>
-
-<file path=ppt/slides/slide11.xml><?xml version="1.0" encoding="utf-8"?>
-<p:sld xmlns:a="http://schemas.openxmlformats.org/drawingml/2006/main" xmlns:r="http://schemas.openxmlformats.org/officeDocument/2006/relationships" xmlns:p="http://schemas.openxmlformats.org/presentationml/2006/main">
-  <p:cSld>
-    <p:spTree>
-      <p:nvGrpSpPr>
-        <p:cNvPr id="1" name=""/>
-        <p:cNvGrpSpPr/>
-        <p:nvPr/>
-      </p:nvGrpSpPr>
-      <p:grpSpPr>
-        <a:xfrm>
-          <a:off x="0" y="0"/>
-          <a:ext cx="0" cy="0"/>
-          <a:chOff x="0" y="0"/>
-          <a:chExt cx="0" cy="0"/>
-        </a:xfrm>
-      </p:grpSpPr>
-      <p:sp>
-        <p:nvSpPr>
-          <p:cNvPr id="24" name="Title 23"/>
-          <p:cNvSpPr>
-            <a:spLocks noGrp="1"/>
-          </p:cNvSpPr>
-          <p:nvPr>
-            <p:ph type="title"/>
-          </p:nvPr>
-        </p:nvSpPr>
-        <p:spPr/>
-        <p:txBody>
-          <a:bodyPr/>
-          <a:lstStyle/>
-          <a:p>
-            <a:r>
-              <a:rPr lang="en-US" dirty="0" smtClean="0"/>
-              <a:t>Insert page title </a:t>
-            </a:r>
-            <a:endParaRPr lang="en-US" b="0" dirty="0"/>
           </a:p>
         </p:txBody>
       </p:sp>
@@ -8426,263 +8306,78 @@
             <p:ph type="body" sz="quarter" idx="10"/>
           </p:nvPr>
         </p:nvSpPr>
-        <p:spPr/>
+        <p:spPr>
+          <a:xfrm>
+            <a:off x="324000" y="1691078"/>
+            <a:ext cx="11545200" cy="4392043"/>
+          </a:xfrm>
+        </p:spPr>
         <p:txBody>
           <a:bodyPr/>
           <a:lstStyle/>
           <a:p>
             <a:r>
               <a:rPr lang="en-US" dirty="0" smtClean="0"/>
-              <a:t>Headline here</a:t>
-            </a:r>
+              <a:t>OpenUI5 (HTML5, CSS3, jQuery)</a:t>
+            </a:r>
+          </a:p>
+          <a:p>
+            <a:r>
+              <a:rPr lang="en-US" dirty="0" smtClean="0"/>
+              <a:t>Node.js</a:t>
+            </a:r>
+          </a:p>
+          <a:p>
+            <a:endParaRPr lang="en-US" dirty="0" smtClean="0"/>
+          </a:p>
+          <a:p>
+            <a:r>
+              <a:rPr lang="en-US" dirty="0" smtClean="0"/>
+              <a:t>OPA5</a:t>
+            </a:r>
+            <a:endParaRPr lang="en-US" dirty="0"/>
+          </a:p>
+          <a:p>
+            <a:r>
+              <a:rPr lang="en-US" dirty="0" err="1"/>
+              <a:t>QUnit</a:t>
+            </a:r>
+            <a:endParaRPr lang="en-US" dirty="0"/>
           </a:p>
           <a:p>
             <a:pPr lvl="1"/>
+            <a:endParaRPr lang="en-US" dirty="0" smtClean="0"/>
+          </a:p>
+          <a:p>
+            <a:r>
+              <a:rPr lang="en-US" dirty="0" smtClean="0"/>
+              <a:t>GIT </a:t>
+            </a:r>
             <a:r>
               <a:rPr lang="en-US" dirty="0" err="1" smtClean="0"/>
-              <a:t>Lorem</a:t>
-            </a:r>
-            <a:r>
-              <a:rPr lang="en-US" dirty="0" smtClean="0"/>
-              <a:t> </a:t>
-            </a:r>
+              <a:t>Versionskontrolle</a:t>
+            </a:r>
+            <a:endParaRPr lang="en-US" dirty="0" smtClean="0"/>
+          </a:p>
+          <a:p>
             <a:r>
               <a:rPr lang="en-US" dirty="0" err="1" smtClean="0"/>
-              <a:t>ipsum</a:t>
-            </a:r>
-            <a:r>
-              <a:rPr lang="en-US" dirty="0" smtClean="0"/>
-              <a:t> dolor sit </a:t>
-            </a:r>
-            <a:r>
-              <a:rPr lang="en-US" dirty="0" err="1" smtClean="0"/>
-              <a:t>amet</a:t>
-            </a:r>
-            <a:r>
-              <a:rPr lang="en-US" dirty="0" smtClean="0"/>
-              <a:t>, </a:t>
-            </a:r>
-            <a:r>
-              <a:rPr lang="en-US" dirty="0" err="1" smtClean="0"/>
-              <a:t>consectetur</a:t>
-            </a:r>
-            <a:r>
-              <a:rPr lang="en-US" dirty="0" smtClean="0"/>
-              <a:t> </a:t>
-            </a:r>
-            <a:r>
-              <a:rPr lang="en-US" dirty="0" err="1" smtClean="0"/>
-              <a:t>adipiscing</a:t>
-            </a:r>
-            <a:r>
-              <a:rPr lang="en-US" dirty="0" smtClean="0"/>
-              <a:t> </a:t>
-            </a:r>
-            <a:r>
-              <a:rPr lang="en-US" dirty="0" err="1" smtClean="0"/>
-              <a:t>elit</a:t>
-            </a:r>
-            <a:r>
-              <a:rPr lang="en-US" dirty="0" smtClean="0"/>
-              <a:t>. Maecenas </a:t>
-            </a:r>
-            <a:r>
-              <a:rPr lang="en-US" dirty="0" err="1" smtClean="0"/>
-              <a:t>pellentesque</a:t>
-            </a:r>
-            <a:r>
-              <a:rPr lang="en-US" dirty="0" smtClean="0"/>
-              <a:t> </a:t>
-            </a:r>
-            <a:r>
-              <a:rPr lang="en-US" dirty="0" err="1" smtClean="0"/>
-              <a:t>laoreet</a:t>
-            </a:r>
-            <a:r>
-              <a:rPr lang="en-US" dirty="0" smtClean="0"/>
-              <a:t> </a:t>
-            </a:r>
-            <a:r>
-              <a:rPr lang="en-US" dirty="0" err="1" smtClean="0"/>
-              <a:t>urna</a:t>
-            </a:r>
-            <a:r>
-              <a:rPr lang="en-US" dirty="0" smtClean="0"/>
-              <a:t> </a:t>
-            </a:r>
-            <a:r>
-              <a:rPr lang="en-US" dirty="0" err="1" smtClean="0"/>
-              <a:t>molestie</a:t>
-            </a:r>
-            <a:r>
-              <a:rPr lang="en-US" dirty="0" smtClean="0"/>
-              <a:t> </a:t>
-            </a:r>
-            <a:r>
-              <a:rPr lang="en-US" dirty="0" err="1" smtClean="0"/>
-              <a:t>placerat</a:t>
-            </a:r>
-            <a:r>
-              <a:rPr lang="en-US" dirty="0" smtClean="0"/>
-              <a:t> </a:t>
-            </a:r>
-            <a:r>
-              <a:rPr lang="en-US" dirty="0" err="1" smtClean="0"/>
-              <a:t>ipsum</a:t>
-            </a:r>
-            <a:r>
-              <a:rPr lang="en-US" dirty="0" smtClean="0"/>
-              <a:t>.</a:t>
-            </a:r>
-          </a:p>
-        </p:txBody>
-      </p:sp>
-      <p:sp>
-        <p:nvSpPr>
-          <p:cNvPr id="4" name="Text Placeholder 3"/>
-          <p:cNvSpPr>
-            <a:spLocks noGrp="1"/>
-          </p:cNvSpPr>
-          <p:nvPr>
-            <p:ph type="body" sz="quarter" idx="14"/>
-          </p:nvPr>
-        </p:nvSpPr>
-        <p:spPr/>
-        <p:txBody>
-          <a:bodyPr/>
-          <a:lstStyle/>
-          <a:p>
-            <a:r>
-              <a:rPr lang="en-US" dirty="0" smtClean="0"/>
-              <a:t>Headline here</a:t>
-            </a:r>
-          </a:p>
-          <a:p>
-            <a:pPr lvl="1"/>
-            <a:r>
-              <a:rPr lang="en-US" dirty="0" err="1" smtClean="0"/>
-              <a:t>Lorem</a:t>
-            </a:r>
-            <a:r>
-              <a:rPr lang="en-US" dirty="0" smtClean="0"/>
-              <a:t> </a:t>
-            </a:r>
-            <a:r>
-              <a:rPr lang="en-US" dirty="0" err="1" smtClean="0"/>
-              <a:t>ipsum</a:t>
-            </a:r>
-            <a:r>
-              <a:rPr lang="en-US" dirty="0" smtClean="0"/>
-              <a:t> dolor sit </a:t>
-            </a:r>
-            <a:r>
-              <a:rPr lang="en-US" dirty="0" err="1" smtClean="0"/>
-              <a:t>amet</a:t>
-            </a:r>
-            <a:r>
-              <a:rPr lang="en-US" dirty="0" smtClean="0"/>
-              <a:t>, </a:t>
-            </a:r>
-            <a:r>
-              <a:rPr lang="en-US" dirty="0" err="1" smtClean="0"/>
-              <a:t>consectetur</a:t>
-            </a:r>
-            <a:r>
-              <a:rPr lang="en-US" dirty="0" smtClean="0"/>
-              <a:t> </a:t>
-            </a:r>
-            <a:r>
-              <a:rPr lang="en-US" dirty="0" err="1" smtClean="0"/>
-              <a:t>adipiscing</a:t>
-            </a:r>
-            <a:r>
-              <a:rPr lang="en-US" dirty="0" smtClean="0"/>
-              <a:t> </a:t>
-            </a:r>
-            <a:r>
-              <a:rPr lang="en-US" dirty="0" err="1" smtClean="0"/>
-              <a:t>elit</a:t>
-            </a:r>
-            <a:r>
-              <a:rPr lang="en-US" dirty="0" smtClean="0"/>
-              <a:t>. Maecenas </a:t>
-            </a:r>
-            <a:r>
-              <a:rPr lang="en-US" dirty="0" err="1" smtClean="0"/>
-              <a:t>pellentesque</a:t>
-            </a:r>
-            <a:r>
-              <a:rPr lang="en-US" dirty="0" smtClean="0"/>
-              <a:t> </a:t>
-            </a:r>
-            <a:r>
-              <a:rPr lang="en-US" dirty="0" err="1" smtClean="0"/>
-              <a:t>laoreet</a:t>
-            </a:r>
-            <a:r>
-              <a:rPr lang="en-US" dirty="0" smtClean="0"/>
-              <a:t> </a:t>
-            </a:r>
-            <a:r>
-              <a:rPr lang="en-US" dirty="0" err="1" smtClean="0"/>
-              <a:t>urna</a:t>
-            </a:r>
-            <a:r>
-              <a:rPr lang="en-US" dirty="0" smtClean="0"/>
-              <a:t> </a:t>
-            </a:r>
-            <a:r>
-              <a:rPr lang="en-US" dirty="0" err="1" smtClean="0"/>
-              <a:t>molestie</a:t>
-            </a:r>
-            <a:r>
-              <a:rPr lang="en-US" dirty="0" smtClean="0"/>
-              <a:t> </a:t>
-            </a:r>
-            <a:r>
-              <a:rPr lang="en-US" dirty="0" err="1" smtClean="0"/>
-              <a:t>placerat</a:t>
-            </a:r>
-            <a:r>
-              <a:rPr lang="en-US" dirty="0" smtClean="0"/>
-              <a:t> </a:t>
-            </a:r>
-            <a:r>
-              <a:rPr lang="en-US" dirty="0" err="1" smtClean="0"/>
-              <a:t>ipsum</a:t>
-            </a:r>
-            <a:r>
-              <a:rPr lang="en-US" dirty="0" smtClean="0"/>
-              <a:t>.</a:t>
-            </a:r>
-          </a:p>
-        </p:txBody>
-      </p:sp>
-      <p:sp>
-        <p:nvSpPr>
-          <p:cNvPr id="7" name="Picture Placeholder 6"/>
-          <p:cNvSpPr>
-            <a:spLocks noGrp="1"/>
-          </p:cNvSpPr>
-          <p:nvPr>
-            <p:ph type="pic" sz="quarter" idx="15"/>
-          </p:nvPr>
-        </p:nvSpPr>
-        <p:spPr/>
-      </p:sp>
-      <p:sp>
-        <p:nvSpPr>
-          <p:cNvPr id="9" name="Picture Placeholder 8"/>
-          <p:cNvSpPr>
-            <a:spLocks noGrp="1"/>
-          </p:cNvSpPr>
-          <p:nvPr>
-            <p:ph type="pic" sz="quarter" idx="16"/>
-          </p:nvPr>
-        </p:nvSpPr>
-        <p:spPr/>
+              <a:t>Wetterdaten</a:t>
+            </a:r>
+            <a:r>
+              <a:rPr lang="en-US" dirty="0" smtClean="0"/>
+              <a:t> von wunderground.com (Weather Underground)</a:t>
+            </a:r>
+            <a:endParaRPr lang="en-US" dirty="0"/>
+          </a:p>
+        </p:txBody>
       </p:sp>
     </p:spTree>
+    <p:extLst>
+      <p:ext uri="{BB962C8B-B14F-4D97-AF65-F5344CB8AC3E}">
+        <p14:creationId xmlns:p14="http://schemas.microsoft.com/office/powerpoint/2010/main" val="3384484319"/>
+      </p:ext>
+    </p:extLst>
   </p:cSld>
   <p:clrMapOvr>
     <a:masterClrMapping/>
@@ -8699,7 +8394,7 @@
 </file>
 
 <file path=ppt/slides/slide12.xml><?xml version="1.0" encoding="utf-8"?>
-<p:sld xmlns:a="http://schemas.openxmlformats.org/drawingml/2006/main" xmlns:r="http://schemas.openxmlformats.org/officeDocument/2006/relationships" xmlns:p="http://schemas.openxmlformats.org/presentationml/2006/main">
+<p:sld xmlns:a="http://schemas.openxmlformats.org/drawingml/2006/main" xmlns:r="http://schemas.openxmlformats.org/officeDocument/2006/relationships" xmlns:p="http://schemas.openxmlformats.org/presentationml/2006/main" show="0">
   <p:cSld>
     <p:spTree>
       <p:nvGrpSpPr>
@@ -8715,40 +8410,12 @@
           <a:chExt cx="0" cy="0"/>
         </a:xfrm>
       </p:grpSpPr>
-      <p:sp>
-        <p:nvSpPr>
-          <p:cNvPr id="5" name="Title 4"/>
-          <p:cNvSpPr>
-            <a:spLocks noGrp="1"/>
-          </p:cNvSpPr>
-          <p:nvPr>
-            <p:ph type="ctrTitle"/>
-          </p:nvPr>
-        </p:nvSpPr>
-        <p:spPr/>
-        <p:txBody>
-          <a:bodyPr/>
-          <a:lstStyle/>
-          <a:p>
-            <a:r>
-              <a:rPr lang="en-US" dirty="0" smtClean="0"/>
-              <a:t>Thank you </a:t>
-            </a:r>
-            <a:r>
-              <a:rPr lang="en-US" dirty="0" smtClean="0">
-                <a:sym typeface="Wingdings" panose="05000000000000000000" pitchFamily="2" charset="2"/>
-              </a:rPr>
-              <a:t></a:t>
-            </a:r>
-            <a:endParaRPr lang="en-US" dirty="0"/>
-          </a:p>
-        </p:txBody>
-      </p:sp>
     </p:spTree>
   </p:cSld>
   <p:clrMapOvr>
     <a:masterClrMapping/>
   </p:clrMapOvr>
+  <p:transition spd="med"/>
   <p:timing>
     <p:tnLst>
       <p:par>
@@ -8781,44 +8448,11 @@
   <p:clrMapOvr>
     <a:masterClrMapping/>
   </p:clrMapOvr>
-  <p:transition spd="med"/>
-  <p:timing>
-    <p:tnLst>
-      <p:par>
-        <p:cTn id="1" dur="indefinite" restart="never" nodeType="tmRoot"/>
-      </p:par>
-    </p:tnLst>
-  </p:timing>
+  <p:transition/>
 </p:sld>
 </file>
 
 <file path=ppt/slides/slide14.xml><?xml version="1.0" encoding="utf-8"?>
-<p:sld xmlns:a="http://schemas.openxmlformats.org/drawingml/2006/main" xmlns:r="http://schemas.openxmlformats.org/officeDocument/2006/relationships" xmlns:p="http://schemas.openxmlformats.org/presentationml/2006/main" show="0">
-  <p:cSld>
-    <p:spTree>
-      <p:nvGrpSpPr>
-        <p:cNvPr id="1" name=""/>
-        <p:cNvGrpSpPr/>
-        <p:nvPr/>
-      </p:nvGrpSpPr>
-      <p:grpSpPr>
-        <a:xfrm>
-          <a:off x="0" y="0"/>
-          <a:ext cx="0" cy="0"/>
-          <a:chOff x="0" y="0"/>
-          <a:chExt cx="0" cy="0"/>
-        </a:xfrm>
-      </p:grpSpPr>
-    </p:spTree>
-  </p:cSld>
-  <p:clrMapOvr>
-    <a:masterClrMapping/>
-  </p:clrMapOvr>
-  <p:transition/>
-</p:sld>
-</file>
-
-<file path=ppt/slides/slide15.xml><?xml version="1.0" encoding="utf-8"?>
 <p:sld xmlns:a="http://schemas.openxmlformats.org/drawingml/2006/main" xmlns:r="http://schemas.openxmlformats.org/officeDocument/2006/relationships" xmlns:p="http://schemas.openxmlformats.org/presentationml/2006/main" show="0">
   <p:cSld>
     <p:spTree>
@@ -9657,7 +9291,7 @@
 </file>
 
 <file path=ppt/slides/slide3.xml><?xml version="1.0" encoding="utf-8"?>
-<p:sld xmlns:a="http://schemas.openxmlformats.org/drawingml/2006/main" xmlns:r="http://schemas.openxmlformats.org/officeDocument/2006/relationships" xmlns:p="http://schemas.openxmlformats.org/presentationml/2006/main" show="0">
+<p:sld xmlns:a="http://schemas.openxmlformats.org/drawingml/2006/main" xmlns:r="http://schemas.openxmlformats.org/officeDocument/2006/relationships" xmlns:p="http://schemas.openxmlformats.org/presentationml/2006/main">
   <p:cSld>
     <p:spTree>
       <p:nvGrpSpPr>
@@ -9673,46 +9307,14 @@
           <a:chExt cx="0" cy="0"/>
         </a:xfrm>
       </p:grpSpPr>
-      <p:pic>
-        <p:nvPicPr>
-          <p:cNvPr id="8" name="Picture Placeholder 4" descr="275257_l_srgb_s_gl copy.jpg"/>
-          <p:cNvPicPr>
-            <a:picLocks noGrp="1" noChangeAspect="1"/>
-          </p:cNvPicPr>
-          <p:nvPr>
-            <p:ph type="pic" sz="quarter" idx="11"/>
-          </p:nvPr>
-        </p:nvPicPr>
-        <p:blipFill rotWithShape="1">
-          <a:blip r:embed="rId3" cstate="screen">
-            <a:extLst>
-              <a:ext uri="{28A0092B-C50C-407E-A947-70E740481C1C}">
-                <a14:useLocalDpi xmlns:a14="http://schemas.microsoft.com/office/drawing/2010/main"/>
-              </a:ext>
-            </a:extLst>
-          </a:blip>
-          <a:srcRect/>
-          <a:stretch/>
-        </p:blipFill>
-        <p:spPr bwMode="gray">
-          <a:prstGeom prst="rect">
-            <a:avLst/>
-          </a:prstGeom>
-          <a:solidFill>
-            <a:schemeClr val="bg1">
-              <a:lumMod val="95000"/>
-            </a:schemeClr>
-          </a:solidFill>
-        </p:spPr>
-      </p:pic>
-      <p:sp>
-        <p:nvSpPr>
-          <p:cNvPr id="3" name="Title 2"/>
+      <p:sp>
+        <p:nvSpPr>
+          <p:cNvPr id="2" name="Title 1"/>
           <p:cNvSpPr>
             <a:spLocks noGrp="1"/>
           </p:cNvSpPr>
           <p:nvPr>
-            <p:ph type="ctrTitle"/>
+            <p:ph type="title"/>
           </p:nvPr>
         </p:nvSpPr>
         <p:spPr/>
@@ -9728,93 +9330,64 @@
           </a:p>
         </p:txBody>
       </p:sp>
-      <p:pic>
-        <p:nvPicPr>
-          <p:cNvPr id="6" name="Picture 5" descr="cloud-supergraphic.png"/>
-          <p:cNvPicPr>
-            <a:picLocks noChangeAspect="1"/>
-          </p:cNvPicPr>
-          <p:nvPr/>
-        </p:nvPicPr>
-        <p:blipFill rotWithShape="1">
-          <a:blip r:embed="rId4" cstate="screen">
-            <a:alphaModFix amt="60000"/>
-            <a:extLst>
-              <a:ext uri="{28A0092B-C50C-407E-A947-70E740481C1C}">
-                <a14:useLocalDpi xmlns:a14="http://schemas.microsoft.com/office/drawing/2010/main"/>
-              </a:ext>
-            </a:extLst>
-          </a:blip>
-          <a:srcRect l="10988" t="23849" b="18011"/>
-          <a:stretch/>
-        </p:blipFill>
-        <p:spPr>
-          <a:xfrm>
-            <a:off x="325640" y="160854"/>
-            <a:ext cx="4934251" cy="2148591"/>
-          </a:xfrm>
-          <a:prstGeom prst="rect">
-            <a:avLst/>
-          </a:prstGeom>
-        </p:spPr>
-      </p:pic>
-      <p:pic>
-        <p:nvPicPr>
-          <p:cNvPr id="7" name="Picture 2" descr="https://upload.wikimedia.org/wikipedia/commons/thumb/3/3c/Weather_station_on_Mount_Vesuvius_(2437693238).jpg/1280px-Weather_station_on_Mount_Vesuvius_(2437693238).jpg"/>
-          <p:cNvPicPr>
-            <a:picLocks noChangeAspect="1" noChangeArrowheads="1"/>
-          </p:cNvPicPr>
-          <p:nvPr/>
-        </p:nvPicPr>
-        <p:blipFill rotWithShape="1">
-          <a:blip r:embed="rId5">
-            <a:extLst>
-              <a:ext uri="{28A0092B-C50C-407E-A947-70E740481C1C}">
-                <a14:useLocalDpi xmlns:a14="http://schemas.microsoft.com/office/drawing/2010/main" val="0"/>
-              </a:ext>
-            </a:extLst>
-          </a:blip>
-          <a:srcRect l="852" t="39273" r="5364" b="34537"/>
-          <a:stretch/>
-        </p:blipFill>
-        <p:spPr bwMode="auto">
-          <a:xfrm>
-            <a:off x="333375" y="152400"/>
-            <a:ext cx="11535825" cy="2143125"/>
-          </a:xfrm>
-          <a:prstGeom prst="rect">
-            <a:avLst/>
-          </a:prstGeom>
-          <a:noFill/>
-          <a:extLst>
-            <a:ext uri="{909E8E84-426E-40DD-AFC4-6F175D3DCCD1}">
-              <a14:hiddenFill xmlns:a14="http://schemas.microsoft.com/office/drawing/2010/main">
-                <a:solidFill>
-                  <a:srgbClr val="FFFFFF"/>
-                </a:solidFill>
-              </a14:hiddenFill>
-            </a:ext>
-          </a:extLst>
-        </p:spPr>
-      </p:pic>
+      <p:sp>
+        <p:nvSpPr>
+          <p:cNvPr id="3" name="Text Placeholder 2"/>
+          <p:cNvSpPr>
+            <a:spLocks noGrp="1"/>
+          </p:cNvSpPr>
+          <p:nvPr>
+            <p:ph type="body" sz="quarter" idx="10"/>
+          </p:nvPr>
+        </p:nvSpPr>
+        <p:spPr/>
+        <p:txBody>
+          <a:bodyPr/>
+          <a:lstStyle/>
+          <a:p>
+            <a:pPr lvl="0"/>
+            <a:r>
+              <a:rPr lang="en-US" dirty="0" err="1" smtClean="0"/>
+              <a:t>Aktuelles</a:t>
+            </a:r>
+            <a:r>
+              <a:rPr lang="en-US" dirty="0" smtClean="0"/>
+              <a:t> Wetter </a:t>
+            </a:r>
+            <a:r>
+              <a:rPr lang="en-US" dirty="0" err="1" smtClean="0"/>
+              <a:t>anzeigen</a:t>
+            </a:r>
+            <a:endParaRPr lang="en-US" dirty="0" smtClean="0"/>
+          </a:p>
+          <a:p>
+            <a:pPr lvl="0"/>
+            <a:r>
+              <a:rPr lang="en-US" dirty="0" err="1" smtClean="0"/>
+              <a:t>Wettervorhersage</a:t>
+            </a:r>
+            <a:endParaRPr lang="en-US" dirty="0" smtClean="0"/>
+          </a:p>
+          <a:p>
+            <a:pPr lvl="0"/>
+            <a:r>
+              <a:rPr lang="en-US" dirty="0" smtClean="0"/>
+              <a:t>Customizing des </a:t>
+            </a:r>
+            <a:r>
+              <a:rPr lang="en-US" dirty="0" err="1" smtClean="0"/>
+              <a:t>Ortes</a:t>
+            </a:r>
+            <a:endParaRPr lang="en-US" dirty="0"/>
+          </a:p>
+        </p:txBody>
+      </p:sp>
     </p:spTree>
-    <p:extLst>
-      <p:ext uri="{BB962C8B-B14F-4D97-AF65-F5344CB8AC3E}">
-        <p14:creationId xmlns:p14="http://schemas.microsoft.com/office/powerpoint/2010/main" val="3174969617"/>
-      </p:ext>
-    </p:extLst>
   </p:cSld>
   <p:clrMapOvr>
     <a:masterClrMapping/>
   </p:clrMapOvr>
-  <mc:AlternateContent xmlns:mc="http://schemas.openxmlformats.org/markup-compatibility/2006" xmlns:p14="http://schemas.microsoft.com/office/powerpoint/2010/main">
-    <mc:Choice Requires="p14">
-      <p:transition spd="slow" p14:dur="2000"/>
-    </mc:Choice>
-    <mc:Fallback xmlns="">
-      <p:transition spd="slow"/>
-    </mc:Fallback>
-  </mc:AlternateContent>
+  <p:transition spd="med"/>
   <p:timing>
     <p:tnLst>
       <p:par>
@@ -9859,114 +9432,6 @@
           <a:p>
             <a:r>
               <a:rPr lang="en-US" dirty="0" err="1" smtClean="0"/>
-              <a:t>Anforderungen</a:t>
-            </a:r>
-            <a:endParaRPr lang="en-US" dirty="0"/>
-          </a:p>
-        </p:txBody>
-      </p:sp>
-      <p:sp>
-        <p:nvSpPr>
-          <p:cNvPr id="3" name="Text Placeholder 2"/>
-          <p:cNvSpPr>
-            <a:spLocks noGrp="1"/>
-          </p:cNvSpPr>
-          <p:nvPr>
-            <p:ph type="body" sz="quarter" idx="10"/>
-          </p:nvPr>
-        </p:nvSpPr>
-        <p:spPr/>
-        <p:txBody>
-          <a:bodyPr/>
-          <a:lstStyle/>
-          <a:p>
-            <a:pPr lvl="0"/>
-            <a:r>
-              <a:rPr lang="en-US" dirty="0" err="1" smtClean="0"/>
-              <a:t>Aktuelles</a:t>
-            </a:r>
-            <a:r>
-              <a:rPr lang="en-US" dirty="0" smtClean="0"/>
-              <a:t> Wetter </a:t>
-            </a:r>
-            <a:r>
-              <a:rPr lang="en-US" dirty="0" err="1" smtClean="0"/>
-              <a:t>anzeigen</a:t>
-            </a:r>
-            <a:endParaRPr lang="en-US" dirty="0" smtClean="0"/>
-          </a:p>
-          <a:p>
-            <a:pPr lvl="0"/>
-            <a:r>
-              <a:rPr lang="en-US" dirty="0" err="1" smtClean="0"/>
-              <a:t>Wettervorhersage</a:t>
-            </a:r>
-            <a:endParaRPr lang="en-US" dirty="0" smtClean="0"/>
-          </a:p>
-          <a:p>
-            <a:pPr lvl="0"/>
-            <a:r>
-              <a:rPr lang="en-US" dirty="0" smtClean="0"/>
-              <a:t>Customizing des </a:t>
-            </a:r>
-            <a:r>
-              <a:rPr lang="en-US" dirty="0" err="1" smtClean="0"/>
-              <a:t>Ortes</a:t>
-            </a:r>
-            <a:endParaRPr lang="en-US" dirty="0"/>
-          </a:p>
-        </p:txBody>
-      </p:sp>
-    </p:spTree>
-  </p:cSld>
-  <p:clrMapOvr>
-    <a:masterClrMapping/>
-  </p:clrMapOvr>
-  <p:transition spd="med"/>
-  <p:timing>
-    <p:tnLst>
-      <p:par>
-        <p:cTn id="1" dur="indefinite" restart="never" nodeType="tmRoot"/>
-      </p:par>
-    </p:tnLst>
-  </p:timing>
-</p:sld>
-</file>
-
-<file path=ppt/slides/slide5.xml><?xml version="1.0" encoding="utf-8"?>
-<p:sld xmlns:a="http://schemas.openxmlformats.org/drawingml/2006/main" xmlns:r="http://schemas.openxmlformats.org/officeDocument/2006/relationships" xmlns:p="http://schemas.openxmlformats.org/presentationml/2006/main">
-  <p:cSld>
-    <p:spTree>
-      <p:nvGrpSpPr>
-        <p:cNvPr id="1" name=""/>
-        <p:cNvGrpSpPr/>
-        <p:nvPr/>
-      </p:nvGrpSpPr>
-      <p:grpSpPr>
-        <a:xfrm>
-          <a:off x="0" y="0"/>
-          <a:ext cx="0" cy="0"/>
-          <a:chOff x="0" y="0"/>
-          <a:chExt cx="0" cy="0"/>
-        </a:xfrm>
-      </p:grpSpPr>
-      <p:sp>
-        <p:nvSpPr>
-          <p:cNvPr id="2" name="Title 1"/>
-          <p:cNvSpPr>
-            <a:spLocks noGrp="1"/>
-          </p:cNvSpPr>
-          <p:nvPr>
-            <p:ph type="title"/>
-          </p:nvPr>
-        </p:nvSpPr>
-        <p:spPr/>
-        <p:txBody>
-          <a:bodyPr/>
-          <a:lstStyle/>
-          <a:p>
-            <a:r>
-              <a:rPr lang="en-US" dirty="0" err="1" smtClean="0"/>
               <a:t>Technische</a:t>
             </a:r>
             <a:r>
@@ -9981,86 +9446,185 @@
           </a:p>
         </p:txBody>
       </p:sp>
-      <p:sp>
-        <p:nvSpPr>
-          <p:cNvPr id="3" name="Text Placeholder 2"/>
-          <p:cNvSpPr>
-            <a:spLocks noGrp="1"/>
-          </p:cNvSpPr>
-          <p:nvPr>
-            <p:ph type="body" sz="quarter" idx="10"/>
-          </p:nvPr>
-        </p:nvSpPr>
+      <p:pic>
+        <p:nvPicPr>
+          <p:cNvPr id="8" name="Picture 7"/>
+          <p:cNvPicPr>
+            <a:picLocks noChangeAspect="1"/>
+          </p:cNvPicPr>
+          <p:nvPr/>
+        </p:nvPicPr>
+        <p:blipFill>
+          <a:blip r:embed="rId3" cstate="print">
+            <a:extLst>
+              <a:ext uri="{28A0092B-C50C-407E-A947-70E740481C1C}">
+                <a14:useLocalDpi xmlns:a14="http://schemas.microsoft.com/office/drawing/2010/main" val="0"/>
+              </a:ext>
+            </a:extLst>
+          </a:blip>
+          <a:stretch>
+            <a:fillRect/>
+          </a:stretch>
+        </p:blipFill>
         <p:spPr>
           <a:xfrm>
-            <a:off x="324000" y="1691078"/>
-            <a:ext cx="11545200" cy="4392043"/>
+            <a:off x="765434" y="1615039"/>
+            <a:ext cx="3810000" cy="990892"/>
           </a:xfrm>
+          <a:prstGeom prst="rect">
+            <a:avLst/>
+          </a:prstGeom>
         </p:spPr>
-        <p:txBody>
-          <a:bodyPr/>
-          <a:lstStyle/>
-          <a:p>
-            <a:r>
-              <a:rPr lang="en-US" dirty="0" smtClean="0"/>
-              <a:t>OpenUI5 </a:t>
-            </a:r>
-            <a:r>
-              <a:rPr lang="en-US" dirty="0" smtClean="0"/>
-              <a:t>(HTML5, CSS3, jQuery)</a:t>
-            </a:r>
-          </a:p>
-          <a:p>
-            <a:r>
-              <a:rPr lang="en-US" dirty="0" smtClean="0"/>
-              <a:t>Node.js</a:t>
-            </a:r>
-          </a:p>
-          <a:p>
-            <a:endParaRPr lang="en-US" dirty="0" smtClean="0"/>
-          </a:p>
-          <a:p>
-            <a:r>
-              <a:rPr lang="en-US" dirty="0" smtClean="0"/>
-              <a:t>OPA5</a:t>
-            </a:r>
-            <a:endParaRPr lang="en-US" dirty="0"/>
-          </a:p>
-          <a:p>
-            <a:r>
-              <a:rPr lang="en-US" dirty="0" err="1"/>
-              <a:t>QUnit</a:t>
-            </a:r>
-            <a:endParaRPr lang="en-US" dirty="0"/>
-          </a:p>
-          <a:p>
-            <a:pPr lvl="1"/>
-            <a:endParaRPr lang="en-US" dirty="0" smtClean="0"/>
-          </a:p>
-          <a:p>
-            <a:r>
-              <a:rPr lang="en-US" dirty="0" smtClean="0"/>
-              <a:t>GIT </a:t>
-            </a:r>
-            <a:r>
-              <a:rPr lang="en-US" dirty="0" err="1" smtClean="0"/>
-              <a:t>Versionskontrolle</a:t>
-            </a:r>
-            <a:endParaRPr lang="en-US" dirty="0" smtClean="0"/>
-          </a:p>
-          <a:p>
-            <a:r>
-              <a:rPr lang="en-US" dirty="0" err="1" smtClean="0"/>
-              <a:t>Wetterdaten</a:t>
-            </a:r>
-            <a:r>
-              <a:rPr lang="en-US" dirty="0" smtClean="0"/>
-              <a:t> von wunderground.com (Weather Underground)</a:t>
-            </a:r>
-            <a:endParaRPr lang="en-US" dirty="0"/>
-          </a:p>
-        </p:txBody>
-      </p:sp>
+      </p:pic>
+      <p:pic>
+        <p:nvPicPr>
+          <p:cNvPr id="3" name="Picture 2"/>
+          <p:cNvPicPr>
+            <a:picLocks noChangeAspect="1"/>
+          </p:cNvPicPr>
+          <p:nvPr/>
+        </p:nvPicPr>
+        <p:blipFill>
+          <a:blip r:embed="rId4">
+            <a:extLst>
+              <a:ext uri="{28A0092B-C50C-407E-A947-70E740481C1C}">
+                <a14:useLocalDpi xmlns:a14="http://schemas.microsoft.com/office/drawing/2010/main" val="0"/>
+              </a:ext>
+            </a:extLst>
+          </a:blip>
+          <a:stretch>
+            <a:fillRect/>
+          </a:stretch>
+        </p:blipFill>
+        <p:spPr>
+          <a:xfrm>
+            <a:off x="6096600" y="3058385"/>
+            <a:ext cx="3810000" cy="1590988"/>
+          </a:xfrm>
+          <a:prstGeom prst="rect">
+            <a:avLst/>
+          </a:prstGeom>
+        </p:spPr>
+      </p:pic>
+      <p:pic>
+        <p:nvPicPr>
+          <p:cNvPr id="4" name="Picture 3"/>
+          <p:cNvPicPr>
+            <a:picLocks noChangeAspect="1"/>
+          </p:cNvPicPr>
+          <p:nvPr/>
+        </p:nvPicPr>
+        <p:blipFill>
+          <a:blip r:embed="rId5" cstate="print">
+            <a:extLst>
+              <a:ext uri="{28A0092B-C50C-407E-A947-70E740481C1C}">
+                <a14:useLocalDpi xmlns:a14="http://schemas.microsoft.com/office/drawing/2010/main" val="0"/>
+              </a:ext>
+            </a:extLst>
+          </a:blip>
+          <a:stretch>
+            <a:fillRect/>
+          </a:stretch>
+        </p:blipFill>
+        <p:spPr>
+          <a:xfrm>
+            <a:off x="6096600" y="5134986"/>
+            <a:ext cx="3810000" cy="1022984"/>
+          </a:xfrm>
+          <a:prstGeom prst="rect">
+            <a:avLst/>
+          </a:prstGeom>
+        </p:spPr>
+      </p:pic>
+      <p:pic>
+        <p:nvPicPr>
+          <p:cNvPr id="5" name="Picture 4"/>
+          <p:cNvPicPr>
+            <a:picLocks noChangeAspect="1"/>
+          </p:cNvPicPr>
+          <p:nvPr/>
+        </p:nvPicPr>
+        <p:blipFill rotWithShape="1">
+          <a:blip r:embed="rId6" cstate="print">
+            <a:extLst>
+              <a:ext uri="{28A0092B-C50C-407E-A947-70E740481C1C}">
+                <a14:useLocalDpi xmlns:a14="http://schemas.microsoft.com/office/drawing/2010/main" val="0"/>
+              </a:ext>
+            </a:extLst>
+          </a:blip>
+          <a:srcRect r="28508" b="81170"/>
+          <a:stretch/>
+        </p:blipFill>
+        <p:spPr>
+          <a:xfrm>
+            <a:off x="765434" y="5101827"/>
+            <a:ext cx="3810000" cy="1089302"/>
+          </a:xfrm>
+          <a:prstGeom prst="rect">
+            <a:avLst/>
+          </a:prstGeom>
+        </p:spPr>
+      </p:pic>
+      <p:pic>
+        <p:nvPicPr>
+          <p:cNvPr id="6" name="Picture 5"/>
+          <p:cNvPicPr>
+            <a:picLocks noChangeAspect="1"/>
+          </p:cNvPicPr>
+          <p:nvPr/>
+        </p:nvPicPr>
+        <p:blipFill>
+          <a:blip r:embed="rId7">
+            <a:extLst>
+              <a:ext uri="{28A0092B-C50C-407E-A947-70E740481C1C}">
+                <a14:useLocalDpi xmlns:a14="http://schemas.microsoft.com/office/drawing/2010/main" val="0"/>
+              </a:ext>
+            </a:extLst>
+          </a:blip>
+          <a:stretch>
+            <a:fillRect/>
+          </a:stretch>
+        </p:blipFill>
+        <p:spPr>
+          <a:xfrm>
+            <a:off x="6096600" y="1665161"/>
+            <a:ext cx="3810000" cy="890648"/>
+          </a:xfrm>
+          <a:prstGeom prst="rect">
+            <a:avLst/>
+          </a:prstGeom>
+        </p:spPr>
+      </p:pic>
+      <p:pic>
+        <p:nvPicPr>
+          <p:cNvPr id="7" name="Picture 6"/>
+          <p:cNvPicPr>
+            <a:picLocks noChangeAspect="1"/>
+          </p:cNvPicPr>
+          <p:nvPr/>
+        </p:nvPicPr>
+        <p:blipFill>
+          <a:blip r:embed="rId8" cstate="print">
+            <a:extLst>
+              <a:ext uri="{28A0092B-C50C-407E-A947-70E740481C1C}">
+                <a14:useLocalDpi xmlns:a14="http://schemas.microsoft.com/office/drawing/2010/main" val="0"/>
+              </a:ext>
+            </a:extLst>
+          </a:blip>
+          <a:stretch>
+            <a:fillRect/>
+          </a:stretch>
+        </p:blipFill>
+        <p:spPr>
+          <a:xfrm>
+            <a:off x="765434" y="3368104"/>
+            <a:ext cx="3810000" cy="971550"/>
+          </a:xfrm>
+          <a:prstGeom prst="rect">
+            <a:avLst/>
+          </a:prstGeom>
+        </p:spPr>
+      </p:pic>
     </p:spTree>
     <p:extLst>
       <p:ext uri="{BB962C8B-B14F-4D97-AF65-F5344CB8AC3E}">
@@ -10082,7 +9646,7 @@
 </p:sld>
 </file>
 
-<file path=ppt/slides/slide6.xml><?xml version="1.0" encoding="utf-8"?>
+<file path=ppt/slides/slide5.xml><?xml version="1.0" encoding="utf-8"?>
 <p:sld xmlns:a="http://schemas.openxmlformats.org/drawingml/2006/main" xmlns:r="http://schemas.openxmlformats.org/officeDocument/2006/relationships" xmlns:p="http://schemas.openxmlformats.org/presentationml/2006/main">
   <p:cSld>
     <p:spTree>
@@ -10241,7 +9805,7 @@
 </p:sld>
 </file>
 
-<file path=ppt/slides/slide7.xml><?xml version="1.0" encoding="utf-8"?>
+<file path=ppt/slides/slide6.xml><?xml version="1.0" encoding="utf-8"?>
 <p:sld xmlns:a="http://schemas.openxmlformats.org/drawingml/2006/main" xmlns:r="http://schemas.openxmlformats.org/officeDocument/2006/relationships" xmlns:p="http://schemas.openxmlformats.org/presentationml/2006/main">
   <p:cSld>
     <p:spTree>
@@ -10299,10 +9863,10 @@
         </p:nvGrpSpPr>
         <p:grpSpPr>
           <a:xfrm>
-            <a:off x="324000" y="1745485"/>
-            <a:ext cx="5448150" cy="2479232"/>
+            <a:off x="324000" y="1452186"/>
+            <a:ext cx="5448150" cy="2474693"/>
             <a:chOff x="324000" y="1745485"/>
-            <a:chExt cx="5448150" cy="2479232"/>
+            <a:chExt cx="5448150" cy="2474693"/>
           </a:xfrm>
         </p:grpSpPr>
         <p:sp>
@@ -10313,7 +9877,7 @@
           </p:nvSpPr>
           <p:spPr>
             <a:xfrm>
-              <a:off x="324000" y="2027023"/>
+              <a:off x="324000" y="2022484"/>
               <a:ext cx="5448150" cy="2197694"/>
             </a:xfrm>
             <a:prstGeom prst="rect">
@@ -10378,7 +9942,10 @@
                 <a:t>&lt;</a:t>
               </a:r>
               <a:r>
-                <a:rPr lang="de-DE" sz="1200" kern="0" dirty="0">
+                <a:rPr lang="de-DE" sz="1200" b="1" kern="0" dirty="0">
+                  <a:solidFill>
+                    <a:srgbClr val="003283"/>
+                  </a:solidFill>
                   <a:latin typeface="Consolas" panose="020B0609020204030204" pitchFamily="49" charset="0"/>
                   <a:ea typeface="Arial Unicode MS" pitchFamily="34" charset="-128"/>
                   <a:cs typeface="Arial Unicode MS" pitchFamily="34" charset="-128"/>
@@ -10408,7 +9975,10 @@
                 <a:t>    </a:t>
               </a:r>
               <a:r>
-                <a:rPr lang="de-DE" sz="1200" kern="0" dirty="0" err="1">
+                <a:rPr lang="de-DE" sz="1200" b="1" kern="0" dirty="0" err="1">
+                  <a:solidFill>
+                    <a:srgbClr val="00B0F0"/>
+                  </a:solidFill>
                   <a:latin typeface="Consolas" panose="020B0609020204030204" pitchFamily="49" charset="0"/>
                   <a:ea typeface="Arial Unicode MS" pitchFamily="34" charset="-128"/>
                   <a:cs typeface="Arial Unicode MS" pitchFamily="34" charset="-128"/>
@@ -10416,12 +9986,21 @@
                 <a:t>text</a:t>
               </a:r>
               <a:r>
+                <a:rPr lang="de-DE" sz="1200" dirty="0">
+                  <a:latin typeface="Consolas" panose="020B0609020204030204" pitchFamily="49" charset="0"/>
+                </a:rPr>
+                <a:t>=</a:t>
+              </a:r>
+              <a:r>
                 <a:rPr lang="de-DE" sz="1200" kern="0" dirty="0">
+                  <a:solidFill>
+                    <a:srgbClr val="92D050"/>
+                  </a:solidFill>
                   <a:latin typeface="Consolas" panose="020B0609020204030204" pitchFamily="49" charset="0"/>
                   <a:ea typeface="Arial Unicode MS" pitchFamily="34" charset="-128"/>
                   <a:cs typeface="Arial Unicode MS" pitchFamily="34" charset="-128"/>
                 </a:rPr>
-                <a:t>="{</a:t>
+                <a:t>"{</a:t>
               </a:r>
             </a:p>
             <a:p>
@@ -10439,6 +10018,9 @@
               </a:pPr>
               <a:r>
                 <a:rPr lang="de-DE" sz="1200" kern="0" dirty="0">
+                  <a:solidFill>
+                    <a:srgbClr val="92D050"/>
+                  </a:solidFill>
                   <a:latin typeface="Consolas" panose="020B0609020204030204" pitchFamily="49" charset="0"/>
                   <a:ea typeface="Arial Unicode MS" pitchFamily="34" charset="-128"/>
                   <a:cs typeface="Arial Unicode MS" pitchFamily="34" charset="-128"/>
@@ -10447,6 +10029,9 @@
               </a:r>
               <a:r>
                 <a:rPr lang="de-DE" sz="1200" kern="0" dirty="0" err="1">
+                  <a:solidFill>
+                    <a:srgbClr val="92D050"/>
+                  </a:solidFill>
                   <a:latin typeface="Consolas" panose="020B0609020204030204" pitchFamily="49" charset="0"/>
                   <a:ea typeface="Arial Unicode MS" pitchFamily="34" charset="-128"/>
                   <a:cs typeface="Arial Unicode MS" pitchFamily="34" charset="-128"/>
@@ -10455,6 +10040,9 @@
               </a:r>
               <a:r>
                 <a:rPr lang="de-DE" sz="1200" kern="0" dirty="0">
+                  <a:solidFill>
+                    <a:srgbClr val="92D050"/>
+                  </a:solidFill>
                   <a:latin typeface="Consolas" panose="020B0609020204030204" pitchFamily="49" charset="0"/>
                   <a:ea typeface="Arial Unicode MS" pitchFamily="34" charset="-128"/>
                   <a:cs typeface="Arial Unicode MS" pitchFamily="34" charset="-128"/>
@@ -10463,6 +10051,9 @@
               </a:r>
               <a:r>
                 <a:rPr lang="de-DE" sz="1200" kern="0" dirty="0" err="1">
+                  <a:solidFill>
+                    <a:srgbClr val="92D050"/>
+                  </a:solidFill>
                   <a:latin typeface="Consolas" panose="020B0609020204030204" pitchFamily="49" charset="0"/>
                   <a:ea typeface="Arial Unicode MS" pitchFamily="34" charset="-128"/>
                   <a:cs typeface="Arial Unicode MS" pitchFamily="34" charset="-128"/>
@@ -10471,6 +10062,9 @@
               </a:r>
               <a:r>
                 <a:rPr lang="de-DE" sz="1200" kern="0" dirty="0">
+                  <a:solidFill>
+                    <a:srgbClr val="92D050"/>
+                  </a:solidFill>
                   <a:latin typeface="Consolas" panose="020B0609020204030204" pitchFamily="49" charset="0"/>
                   <a:ea typeface="Arial Unicode MS" pitchFamily="34" charset="-128"/>
                   <a:cs typeface="Arial Unicode MS" pitchFamily="34" charset="-128"/>
@@ -10479,6 +10073,9 @@
               </a:r>
               <a:r>
                 <a:rPr lang="de-DE" sz="1200" kern="0" dirty="0" err="1">
+                  <a:solidFill>
+                    <a:srgbClr val="92D050"/>
+                  </a:solidFill>
                   <a:latin typeface="Consolas" panose="020B0609020204030204" pitchFamily="49" charset="0"/>
                   <a:ea typeface="Arial Unicode MS" pitchFamily="34" charset="-128"/>
                   <a:cs typeface="Arial Unicode MS" pitchFamily="34" charset="-128"/>
@@ -10487,6 +10084,9 @@
               </a:r>
               <a:r>
                 <a:rPr lang="de-DE" sz="1200" kern="0" dirty="0">
+                  <a:solidFill>
+                    <a:srgbClr val="92D050"/>
+                  </a:solidFill>
                   <a:latin typeface="Consolas" panose="020B0609020204030204" pitchFamily="49" charset="0"/>
                   <a:ea typeface="Arial Unicode MS" pitchFamily="34" charset="-128"/>
                   <a:cs typeface="Arial Unicode MS" pitchFamily="34" charset="-128"/>
@@ -10495,6 +10095,9 @@
               </a:r>
               <a:r>
                 <a:rPr lang="de-DE" sz="1200" kern="0" dirty="0" err="1">
+                  <a:solidFill>
+                    <a:srgbClr val="92D050"/>
+                  </a:solidFill>
                   <a:latin typeface="Consolas" panose="020B0609020204030204" pitchFamily="49" charset="0"/>
                   <a:ea typeface="Arial Unicode MS" pitchFamily="34" charset="-128"/>
                   <a:cs typeface="Arial Unicode MS" pitchFamily="34" charset="-128"/>
@@ -10503,6 +10106,9 @@
               </a:r>
               <a:r>
                 <a:rPr lang="de-DE" sz="1200" kern="0" dirty="0">
+                  <a:solidFill>
+                    <a:srgbClr val="92D050"/>
+                  </a:solidFill>
                   <a:latin typeface="Consolas" panose="020B0609020204030204" pitchFamily="49" charset="0"/>
                   <a:ea typeface="Arial Unicode MS" pitchFamily="34" charset="-128"/>
                   <a:cs typeface="Arial Unicode MS" pitchFamily="34" charset="-128"/>
@@ -10525,6 +10131,9 @@
               </a:pPr>
               <a:r>
                 <a:rPr lang="de-DE" sz="1200" kern="0" dirty="0">
+                  <a:solidFill>
+                    <a:srgbClr val="92D050"/>
+                  </a:solidFill>
                   <a:latin typeface="Consolas" panose="020B0609020204030204" pitchFamily="49" charset="0"/>
                   <a:ea typeface="Arial Unicode MS" pitchFamily="34" charset="-128"/>
                   <a:cs typeface="Arial Unicode MS" pitchFamily="34" charset="-128"/>
@@ -10533,6 +10142,9 @@
               </a:r>
               <a:r>
                 <a:rPr lang="de-DE" sz="1200" kern="0" dirty="0" err="1">
+                  <a:solidFill>
+                    <a:srgbClr val="92D050"/>
+                  </a:solidFill>
                   <a:latin typeface="Consolas" panose="020B0609020204030204" pitchFamily="49" charset="0"/>
                   <a:ea typeface="Arial Unicode MS" pitchFamily="34" charset="-128"/>
                   <a:cs typeface="Arial Unicode MS" pitchFamily="34" charset="-128"/>
@@ -10541,6 +10153,9 @@
               </a:r>
               <a:r>
                 <a:rPr lang="de-DE" sz="1200" kern="0" dirty="0">
+                  <a:solidFill>
+                    <a:srgbClr val="92D050"/>
+                  </a:solidFill>
                   <a:latin typeface="Consolas" panose="020B0609020204030204" pitchFamily="49" charset="0"/>
                   <a:ea typeface="Arial Unicode MS" pitchFamily="34" charset="-128"/>
                   <a:cs typeface="Arial Unicode MS" pitchFamily="34" charset="-128"/>
@@ -10549,6 +10164,9 @@
               </a:r>
               <a:r>
                 <a:rPr lang="de-DE" sz="1200" kern="0" dirty="0" err="1">
+                  <a:solidFill>
+                    <a:srgbClr val="92D050"/>
+                  </a:solidFill>
                   <a:latin typeface="Consolas" panose="020B0609020204030204" pitchFamily="49" charset="0"/>
                   <a:ea typeface="Arial Unicode MS" pitchFamily="34" charset="-128"/>
                   <a:cs typeface="Arial Unicode MS" pitchFamily="34" charset="-128"/>
@@ -10557,6 +10175,9 @@
               </a:r>
               <a:r>
                 <a:rPr lang="de-DE" sz="1200" b="1" kern="0" dirty="0" err="1">
+                  <a:solidFill>
+                    <a:srgbClr val="92D050"/>
+                  </a:solidFill>
                   <a:latin typeface="Consolas" panose="020B0609020204030204" pitchFamily="49" charset="0"/>
                   <a:ea typeface="Arial Unicode MS" pitchFamily="34" charset="-128"/>
                   <a:cs typeface="Arial Unicode MS" pitchFamily="34" charset="-128"/>
@@ -10565,6 +10186,9 @@
               </a:r>
               <a:r>
                 <a:rPr lang="de-DE" sz="1200" kern="0" dirty="0">
+                  <a:solidFill>
+                    <a:srgbClr val="92D050"/>
+                  </a:solidFill>
                   <a:latin typeface="Consolas" panose="020B0609020204030204" pitchFamily="49" charset="0"/>
                   <a:ea typeface="Arial Unicode MS" pitchFamily="34" charset="-128"/>
                   <a:cs typeface="Arial Unicode MS" pitchFamily="34" charset="-128"/>
@@ -10587,6 +10211,9 @@
               </a:pPr>
               <a:r>
                 <a:rPr lang="de-DE" sz="1200" kern="0" dirty="0">
+                  <a:solidFill>
+                    <a:srgbClr val="92D050"/>
+                  </a:solidFill>
                   <a:latin typeface="Consolas" panose="020B0609020204030204" pitchFamily="49" charset="0"/>
                   <a:ea typeface="Arial Unicode MS" pitchFamily="34" charset="-128"/>
                   <a:cs typeface="Arial Unicode MS" pitchFamily="34" charset="-128"/>
@@ -10616,7 +10243,10 @@
                 <a:t>    </a:t>
               </a:r>
               <a:r>
-                <a:rPr lang="de-DE" sz="1200" kern="0" dirty="0" err="1">
+                <a:rPr lang="de-DE" sz="1200" b="1" kern="0" dirty="0" err="1">
+                  <a:solidFill>
+                    <a:srgbClr val="00B0F0"/>
+                  </a:solidFill>
                   <a:latin typeface="Consolas" panose="020B0609020204030204" pitchFamily="49" charset="0"/>
                   <a:ea typeface="Arial Unicode MS" pitchFamily="34" charset="-128"/>
                   <a:cs typeface="Arial Unicode MS" pitchFamily="34" charset="-128"/>
@@ -10624,15 +10254,27 @@
                 <a:t>class</a:t>
               </a:r>
               <a:r>
+                <a:rPr lang="de-DE" sz="1200" dirty="0">
+                  <a:latin typeface="Consolas" panose="020B0609020204030204" pitchFamily="49" charset="0"/>
+                </a:rPr>
+                <a:t>=</a:t>
+              </a:r>
+              <a:r>
                 <a:rPr lang="de-DE" sz="1200" kern="0" dirty="0">
+                  <a:solidFill>
+                    <a:srgbClr val="92D050"/>
+                  </a:solidFill>
                   <a:latin typeface="Consolas" panose="020B0609020204030204" pitchFamily="49" charset="0"/>
                   <a:ea typeface="Arial Unicode MS" pitchFamily="34" charset="-128"/>
                   <a:cs typeface="Arial Unicode MS" pitchFamily="34" charset="-128"/>
                 </a:rPr>
-                <a:t>="</a:t>
+                <a:t>"</a:t>
               </a:r>
               <a:r>
                 <a:rPr lang="de-DE" sz="1200" kern="0" dirty="0" err="1">
+                  <a:solidFill>
+                    <a:srgbClr val="92D050"/>
+                  </a:solidFill>
                   <a:latin typeface="Consolas" panose="020B0609020204030204" pitchFamily="49" charset="0"/>
                   <a:ea typeface="Arial Unicode MS" pitchFamily="34" charset="-128"/>
                   <a:cs typeface="Arial Unicode MS" pitchFamily="34" charset="-128"/>
@@ -10641,6 +10283,9 @@
               </a:r>
               <a:r>
                 <a:rPr lang="de-DE" sz="1200" kern="0" dirty="0">
+                  <a:solidFill>
+                    <a:srgbClr val="92D050"/>
+                  </a:solidFill>
                   <a:latin typeface="Consolas" panose="020B0609020204030204" pitchFamily="49" charset="0"/>
                   <a:ea typeface="Arial Unicode MS" pitchFamily="34" charset="-128"/>
                   <a:cs typeface="Arial Unicode MS" pitchFamily="34" charset="-128"/>
@@ -10670,7 +10315,10 @@
                 <a:t>    </a:t>
               </a:r>
               <a:r>
-                <a:rPr lang="de-DE" sz="1200" kern="0" dirty="0" err="1">
+                <a:rPr lang="de-DE" sz="1200" b="1" kern="0" dirty="0" err="1">
+                  <a:solidFill>
+                    <a:srgbClr val="00B0F0"/>
+                  </a:solidFill>
                   <a:latin typeface="Consolas" panose="020B0609020204030204" pitchFamily="49" charset="0"/>
                   <a:ea typeface="Arial Unicode MS" pitchFamily="34" charset="-128"/>
                   <a:cs typeface="Arial Unicode MS" pitchFamily="34" charset="-128"/>
@@ -10678,15 +10326,27 @@
                 <a:t>id</a:t>
               </a:r>
               <a:r>
+                <a:rPr lang="de-DE" sz="1200" dirty="0">
+                  <a:latin typeface="Consolas" panose="020B0609020204030204" pitchFamily="49" charset="0"/>
+                </a:rPr>
+                <a:t>=</a:t>
+              </a:r>
+              <a:r>
                 <a:rPr lang="de-DE" sz="1200" kern="0" dirty="0">
+                  <a:solidFill>
+                    <a:srgbClr val="92D050"/>
+                  </a:solidFill>
                   <a:latin typeface="Consolas" panose="020B0609020204030204" pitchFamily="49" charset="0"/>
                   <a:ea typeface="Arial Unicode MS" pitchFamily="34" charset="-128"/>
                   <a:cs typeface="Arial Unicode MS" pitchFamily="34" charset="-128"/>
                 </a:rPr>
-                <a:t>="</a:t>
+                <a:t>"</a:t>
               </a:r>
               <a:r>
                 <a:rPr lang="de-DE" sz="1200" kern="0" dirty="0" err="1">
+                  <a:solidFill>
+                    <a:srgbClr val="92D050"/>
+                  </a:solidFill>
                   <a:latin typeface="Consolas" panose="020B0609020204030204" pitchFamily="49" charset="0"/>
                   <a:ea typeface="Arial Unicode MS" pitchFamily="34" charset="-128"/>
                   <a:cs typeface="Arial Unicode MS" pitchFamily="34" charset="-128"/>
@@ -10695,11 +10355,33 @@
               </a:r>
               <a:r>
                 <a:rPr lang="de-DE" sz="1200" kern="0" dirty="0">
+                  <a:solidFill>
+                    <a:srgbClr val="92D050"/>
+                  </a:solidFill>
                   <a:latin typeface="Consolas" panose="020B0609020204030204" pitchFamily="49" charset="0"/>
                   <a:ea typeface="Arial Unicode MS" pitchFamily="34" charset="-128"/>
                   <a:cs typeface="Arial Unicode MS" pitchFamily="34" charset="-128"/>
                 </a:rPr>
-                <a:t>" /&gt;</a:t>
+                <a:t>"</a:t>
+              </a:r>
+              <a:r>
+                <a:rPr lang="de-DE" sz="1200" kern="0" dirty="0">
+                  <a:solidFill>
+                    <a:srgbClr val="FF0000"/>
+                  </a:solidFill>
+                  <a:latin typeface="Consolas" panose="020B0609020204030204" pitchFamily="49" charset="0"/>
+                  <a:ea typeface="Arial Unicode MS" pitchFamily="34" charset="-128"/>
+                  <a:cs typeface="Arial Unicode MS" pitchFamily="34" charset="-128"/>
+                </a:rPr>
+                <a:t> </a:t>
+              </a:r>
+              <a:r>
+                <a:rPr lang="de-DE" sz="1200" kern="0" dirty="0">
+                  <a:latin typeface="Consolas" panose="020B0609020204030204" pitchFamily="49" charset="0"/>
+                  <a:ea typeface="Arial Unicode MS" pitchFamily="34" charset="-128"/>
+                  <a:cs typeface="Arial Unicode MS" pitchFamily="34" charset="-128"/>
+                </a:rPr>
+                <a:t>/&gt;</a:t>
               </a:r>
             </a:p>
           </p:txBody>
@@ -10713,7 +10395,7 @@
           <p:spPr>
             <a:xfrm>
               <a:off x="324000" y="1745485"/>
-              <a:ext cx="1781175" cy="276999"/>
+              <a:ext cx="1781175" cy="230832"/>
             </a:xfrm>
             <a:prstGeom prst="rect">
               <a:avLst/>
@@ -10739,7 +10421,7 @@
                 <a:buSzPct val="80000"/>
               </a:pPr>
               <a:r>
-                <a:rPr lang="de-DE" sz="1800" kern="0" dirty="0" smtClean="0">
+                <a:rPr lang="de-DE" sz="1500" kern="0" dirty="0" smtClean="0">
                   <a:ea typeface="Arial Unicode MS" pitchFamily="34" charset="-128"/>
                   <a:cs typeface="Arial Unicode MS" pitchFamily="34" charset="-128"/>
                 </a:rPr>
@@ -10757,8 +10439,8 @@
         </p:nvGrpSpPr>
         <p:grpSpPr>
           <a:xfrm>
-            <a:off x="6096600" y="1745485"/>
-            <a:ext cx="5352901" cy="2224574"/>
+            <a:off x="324000" y="3987039"/>
+            <a:ext cx="5448150" cy="2224574"/>
             <a:chOff x="6096600" y="2399230"/>
             <a:chExt cx="5352901" cy="2224574"/>
           </a:xfrm>
@@ -10829,6 +10511,12 @@
               </a:pPr>
               <a:r>
                 <a:rPr lang="en-US" sz="1200" b="1" kern="0" dirty="0" err="1" smtClean="0">
+                  <a:solidFill>
+                    <a:schemeClr val="tx1">
+                      <a:lumMod val="95000"/>
+                      <a:lumOff val="5000"/>
+                    </a:schemeClr>
+                  </a:solidFill>
                   <a:latin typeface="Consolas" panose="020B0609020204030204" pitchFamily="49" charset="0"/>
                   <a:ea typeface="Arial Unicode MS" pitchFamily="34" charset="-128"/>
                   <a:cs typeface="Arial Unicode MS" pitchFamily="34" charset="-128"/>
@@ -10841,7 +10529,26 @@
                   <a:ea typeface="Arial Unicode MS" pitchFamily="34" charset="-128"/>
                   <a:cs typeface="Arial Unicode MS" pitchFamily="34" charset="-128"/>
                 </a:rPr>
-                <a:t>: function(temp){</a:t>
+                <a:t>: </a:t>
+              </a:r>
+              <a:r>
+                <a:rPr lang="en-US" sz="1200" kern="0" dirty="0">
+                  <a:solidFill>
+                    <a:srgbClr val="FFC000"/>
+                  </a:solidFill>
+                  <a:latin typeface="Consolas" panose="020B0609020204030204" pitchFamily="49" charset="0"/>
+                  <a:ea typeface="Arial Unicode MS" pitchFamily="34" charset="-128"/>
+                  <a:cs typeface="Arial Unicode MS" pitchFamily="34" charset="-128"/>
+                </a:rPr>
+                <a:t>function</a:t>
+              </a:r>
+              <a:r>
+                <a:rPr lang="en-US" sz="1200" kern="0" dirty="0">
+                  <a:latin typeface="Consolas" panose="020B0609020204030204" pitchFamily="49" charset="0"/>
+                  <a:ea typeface="Arial Unicode MS" pitchFamily="34" charset="-128"/>
+                  <a:cs typeface="Arial Unicode MS" pitchFamily="34" charset="-128"/>
+                </a:rPr>
+                <a:t>(temp){</a:t>
               </a:r>
             </a:p>
             <a:p>
@@ -10863,7 +10570,34 @@
                   <a:ea typeface="Arial Unicode MS" pitchFamily="34" charset="-128"/>
                   <a:cs typeface="Arial Unicode MS" pitchFamily="34" charset="-128"/>
                 </a:rPr>
-                <a:t>    if(!temp){</a:t>
+                <a:t>    </a:t>
+              </a:r>
+              <a:r>
+                <a:rPr lang="en-US" sz="1200" kern="0" dirty="0" smtClean="0">
+                  <a:solidFill>
+                    <a:srgbClr val="FFC000"/>
+                  </a:solidFill>
+                  <a:latin typeface="Consolas" panose="020B0609020204030204" pitchFamily="49" charset="0"/>
+                  <a:ea typeface="Arial Unicode MS" pitchFamily="34" charset="-128"/>
+                  <a:cs typeface="Arial Unicode MS" pitchFamily="34" charset="-128"/>
+                </a:rPr>
+                <a:t>if</a:t>
+              </a:r>
+              <a:r>
+                <a:rPr lang="en-US" sz="1200" kern="0" dirty="0" smtClean="0">
+                  <a:latin typeface="Consolas" panose="020B0609020204030204" pitchFamily="49" charset="0"/>
+                  <a:ea typeface="Arial Unicode MS" pitchFamily="34" charset="-128"/>
+                  <a:cs typeface="Arial Unicode MS" pitchFamily="34" charset="-128"/>
+                </a:rPr>
+                <a:t> (!</a:t>
+              </a:r>
+              <a:r>
+                <a:rPr lang="en-US" sz="1200" kern="0" dirty="0">
+                  <a:latin typeface="Consolas" panose="020B0609020204030204" pitchFamily="49" charset="0"/>
+                  <a:ea typeface="Arial Unicode MS" pitchFamily="34" charset="-128"/>
+                  <a:cs typeface="Arial Unicode MS" pitchFamily="34" charset="-128"/>
+                </a:rPr>
+                <a:t>temp){</a:t>
               </a:r>
             </a:p>
             <a:p>
@@ -10885,7 +10619,26 @@
                   <a:ea typeface="Arial Unicode MS" pitchFamily="34" charset="-128"/>
                   <a:cs typeface="Arial Unicode MS" pitchFamily="34" charset="-128"/>
                 </a:rPr>
-                <a:t>        return "";</a:t>
+                <a:t>        </a:t>
+              </a:r>
+              <a:r>
+                <a:rPr lang="en-US" sz="1200" kern="0" dirty="0">
+                  <a:solidFill>
+                    <a:srgbClr val="FFC000"/>
+                  </a:solidFill>
+                  <a:latin typeface="Consolas" panose="020B0609020204030204" pitchFamily="49" charset="0"/>
+                  <a:ea typeface="Arial Unicode MS" pitchFamily="34" charset="-128"/>
+                  <a:cs typeface="Arial Unicode MS" pitchFamily="34" charset="-128"/>
+                </a:rPr>
+                <a:t>return</a:t>
+              </a:r>
+              <a:r>
+                <a:rPr lang="en-US" sz="1200" kern="0" dirty="0">
+                  <a:latin typeface="Consolas" panose="020B0609020204030204" pitchFamily="49" charset="0"/>
+                  <a:ea typeface="Arial Unicode MS" pitchFamily="34" charset="-128"/>
+                  <a:cs typeface="Arial Unicode MS" pitchFamily="34" charset="-128"/>
+                </a:rPr>
+                <a:t> "";</a:t>
               </a:r>
             </a:p>
             <a:p>
@@ -10929,7 +10682,37 @@
                   <a:ea typeface="Arial Unicode MS" pitchFamily="34" charset="-128"/>
                   <a:cs typeface="Arial Unicode MS" pitchFamily="34" charset="-128"/>
                 </a:rPr>
-                <a:t>    return </a:t>
+                <a:t>    </a:t>
+              </a:r>
+              <a:r>
+                <a:rPr lang="en-US" sz="1200" kern="0" dirty="0">
+                  <a:solidFill>
+                    <a:srgbClr val="FFC000"/>
+                  </a:solidFill>
+                  <a:latin typeface="Consolas" panose="020B0609020204030204" pitchFamily="49" charset="0"/>
+                  <a:ea typeface="Arial Unicode MS" pitchFamily="34" charset="-128"/>
+                  <a:cs typeface="Arial Unicode MS" pitchFamily="34" charset="-128"/>
+                </a:rPr>
+                <a:t>return</a:t>
+              </a:r>
+              <a:r>
+                <a:rPr lang="en-US" sz="1200" kern="0" dirty="0">
+                  <a:latin typeface="Consolas" panose="020B0609020204030204" pitchFamily="49" charset="0"/>
+                  <a:ea typeface="Arial Unicode MS" pitchFamily="34" charset="-128"/>
+                  <a:cs typeface="Arial Unicode MS" pitchFamily="34" charset="-128"/>
+                </a:rPr>
+                <a:t> </a:t>
+              </a:r>
+              <a:r>
+                <a:rPr lang="en-US" sz="1200" kern="0" dirty="0" err="1">
+                  <a:solidFill>
+                    <a:srgbClr val="2B3F7B"/>
+                  </a:solidFill>
+                  <a:latin typeface="Consolas" panose="020B0609020204030204" pitchFamily="49" charset="0"/>
+                  <a:ea typeface="Arial Unicode MS" pitchFamily="34" charset="-128"/>
+                  <a:cs typeface="Arial Unicode MS" pitchFamily="34" charset="-128"/>
+                </a:rPr>
+                <a:t>Math</a:t>
               </a:r>
               <a:r>
                 <a:rPr lang="en-US" sz="1200" kern="0" dirty="0" err="1">
@@ -10937,7 +10720,7 @@
                   <a:ea typeface="Arial Unicode MS" pitchFamily="34" charset="-128"/>
                   <a:cs typeface="Arial Unicode MS" pitchFamily="34" charset="-128"/>
                 </a:rPr>
-                <a:t>Math.round</a:t>
+                <a:t>.round</a:t>
               </a:r>
               <a:r>
                 <a:rPr lang="en-US" sz="1200" kern="0" dirty="0">
@@ -10962,7 +10745,7 @@
                 <a:buSzPct val="80000"/>
               </a:pPr>
               <a:r>
-                <a:rPr lang="en-US" sz="1200" kern="0" dirty="0">
+                <a:rPr lang="en-US" sz="1200" kern="0" dirty="0" smtClean="0">
                   <a:latin typeface="Consolas" panose="020B0609020204030204" pitchFamily="49" charset="0"/>
                   <a:ea typeface="Arial Unicode MS" pitchFamily="34" charset="-128"/>
                   <a:cs typeface="Arial Unicode MS" pitchFamily="34" charset="-128"/>
@@ -10986,7 +10769,7 @@
           <p:spPr>
             <a:xfrm>
               <a:off x="6096600" y="2399230"/>
-              <a:ext cx="1781175" cy="276999"/>
+              <a:ext cx="1781175" cy="230832"/>
             </a:xfrm>
             <a:prstGeom prst="rect">
               <a:avLst/>
@@ -11012,13 +10795,13 @@
                 <a:buSzPct val="80000"/>
               </a:pPr>
               <a:r>
-                <a:rPr lang="de-DE" sz="1800" kern="0" dirty="0" err="1" smtClean="0">
+                <a:rPr lang="de-DE" sz="1500" kern="0" dirty="0" err="1" smtClean="0">
                   <a:ea typeface="Arial Unicode MS" pitchFamily="34" charset="-128"/>
                   <a:cs typeface="Arial Unicode MS" pitchFamily="34" charset="-128"/>
                 </a:rPr>
                 <a:t>Formatter</a:t>
               </a:r>
-              <a:endParaRPr lang="de-DE" sz="1800" kern="0" dirty="0" smtClean="0">
+              <a:endParaRPr lang="de-DE" sz="1500" kern="0" dirty="0" smtClean="0">
                 <a:ea typeface="Arial Unicode MS" pitchFamily="34" charset="-128"/>
                 <a:cs typeface="Arial Unicode MS" pitchFamily="34" charset="-128"/>
               </a:endParaRPr>
@@ -11026,6 +10809,906 @@
           </p:txBody>
         </p:sp>
       </p:grpSp>
+      <p:grpSp>
+        <p:nvGrpSpPr>
+          <p:cNvPr id="45" name="Group 44"/>
+          <p:cNvGrpSpPr/>
+          <p:nvPr/>
+        </p:nvGrpSpPr>
+        <p:grpSpPr>
+          <a:xfrm>
+            <a:off x="6369269" y="1445973"/>
+            <a:ext cx="5499931" cy="4765640"/>
+            <a:chOff x="6369269" y="1445973"/>
+            <a:chExt cx="5499931" cy="4765640"/>
+          </a:xfrm>
+        </p:grpSpPr>
+        <p:sp>
+          <p:nvSpPr>
+            <p:cNvPr id="10" name="TextBox 9"/>
+            <p:cNvSpPr txBox="1"/>
+            <p:nvPr/>
+          </p:nvSpPr>
+          <p:spPr>
+            <a:xfrm>
+              <a:off x="6369269" y="1445973"/>
+              <a:ext cx="1781175" cy="230832"/>
+            </a:xfrm>
+            <a:prstGeom prst="rect">
+              <a:avLst/>
+            </a:prstGeom>
+            <a:noFill/>
+          </p:spPr>
+          <p:txBody>
+            <a:bodyPr wrap="square" lIns="0" tIns="0" rIns="0" bIns="0" rtlCol="0">
+              <a:spAutoFit/>
+            </a:bodyPr>
+            <a:lstStyle/>
+            <a:p>
+              <a:pPr fontAlgn="base">
+                <a:spcBef>
+                  <a:spcPts val="600"/>
+                </a:spcBef>
+                <a:spcAft>
+                  <a:spcPct val="0"/>
+                </a:spcAft>
+                <a:buClr>
+                  <a:srgbClr val="F0AB00"/>
+                </a:buClr>
+                <a:buSzPct val="80000"/>
+              </a:pPr>
+              <a:r>
+                <a:rPr lang="de-DE" sz="1500" kern="0" dirty="0" smtClean="0">
+                  <a:ea typeface="Arial Unicode MS" pitchFamily="34" charset="-128"/>
+                  <a:cs typeface="Arial Unicode MS" pitchFamily="34" charset="-128"/>
+                </a:rPr>
+                <a:t>Modell „</a:t>
+              </a:r>
+              <a:r>
+                <a:rPr lang="de-DE" sz="1500" kern="0" dirty="0" err="1" smtClean="0">
+                  <a:ea typeface="Arial Unicode MS" pitchFamily="34" charset="-128"/>
+                  <a:cs typeface="Arial Unicode MS" pitchFamily="34" charset="-128"/>
+                </a:rPr>
+                <a:t>data</a:t>
+              </a:r>
+              <a:r>
+                <a:rPr lang="de-DE" sz="1500" kern="0" dirty="0" smtClean="0">
+                  <a:ea typeface="Arial Unicode MS" pitchFamily="34" charset="-128"/>
+                  <a:cs typeface="Arial Unicode MS" pitchFamily="34" charset="-128"/>
+                </a:rPr>
+                <a:t>“</a:t>
+              </a:r>
+              <a:endParaRPr lang="de-DE" sz="1500" kern="0" dirty="0" smtClean="0">
+                <a:ea typeface="Arial Unicode MS" pitchFamily="34" charset="-128"/>
+                <a:cs typeface="Arial Unicode MS" pitchFamily="34" charset="-128"/>
+              </a:endParaRPr>
+            </a:p>
+          </p:txBody>
+        </p:sp>
+        <p:grpSp>
+          <p:nvGrpSpPr>
+            <p:cNvPr id="34" name="Group 33"/>
+            <p:cNvGrpSpPr/>
+            <p:nvPr/>
+          </p:nvGrpSpPr>
+          <p:grpSpPr>
+            <a:xfrm>
+              <a:off x="6369269" y="1729185"/>
+              <a:ext cx="5499931" cy="4482428"/>
+              <a:chOff x="6369269" y="1822008"/>
+              <a:chExt cx="5499931" cy="4482428"/>
+            </a:xfrm>
+          </p:grpSpPr>
+          <p:sp>
+            <p:nvSpPr>
+              <p:cNvPr id="3" name="Rectangle 2"/>
+              <p:cNvSpPr/>
+              <p:nvPr/>
+            </p:nvSpPr>
+            <p:spPr bwMode="gray">
+              <a:xfrm>
+                <a:off x="6369269" y="1822008"/>
+                <a:ext cx="5499931" cy="4482428"/>
+              </a:xfrm>
+              <a:prstGeom prst="rect">
+                <a:avLst/>
+              </a:prstGeom>
+              <a:solidFill>
+                <a:schemeClr val="bg1">
+                  <a:lumMod val="95000"/>
+                </a:schemeClr>
+              </a:solidFill>
+              <a:ln w="6350" algn="ctr">
+                <a:solidFill>
+                  <a:schemeClr val="tx1"/>
+                </a:solidFill>
+                <a:prstDash val="dash"/>
+                <a:miter lim="800000"/>
+                <a:headEnd/>
+                <a:tailEnd/>
+              </a:ln>
+            </p:spPr>
+            <p:txBody>
+              <a:bodyPr lIns="90000" tIns="72000" rIns="90000" bIns="72000" rtlCol="0" anchor="ctr"/>
+              <a:lstStyle/>
+              <a:p>
+                <a:pPr marR="0" algn="ctr" defTabSz="914400" eaLnBrk="1" fontAlgn="base" latinLnBrk="0" hangingPunct="1">
+                  <a:lnSpc>
+                    <a:spcPct val="100000"/>
+                  </a:lnSpc>
+                  <a:spcBef>
+                    <a:spcPct val="50000"/>
+                  </a:spcBef>
+                  <a:spcAft>
+                    <a:spcPct val="0"/>
+                  </a:spcAft>
+                  <a:buClr>
+                    <a:srgbClr val="F0AB00"/>
+                  </a:buClr>
+                  <a:buSzPct val="80000"/>
+                  <a:tabLst/>
+                </a:pPr>
+                <a:endParaRPr kumimoji="0" lang="de-DE" sz="2000" b="0" i="0" u="none" strike="noStrike" kern="0" cap="none" spc="0" normalizeH="0" baseline="0" noProof="0" dirty="0" err="1" smtClean="0">
+                  <a:ln>
+                    <a:noFill/>
+                  </a:ln>
+                  <a:effectLst/>
+                  <a:uLnTx/>
+                  <a:uFillTx/>
+                  <a:ea typeface="Arial Unicode MS" pitchFamily="34" charset="-128"/>
+                  <a:cs typeface="Arial Unicode MS" pitchFamily="34" charset="-128"/>
+                </a:endParaRPr>
+              </a:p>
+            </p:txBody>
+          </p:sp>
+          <p:sp>
+            <p:nvSpPr>
+              <p:cNvPr id="4" name="Rounded Rectangle 3"/>
+              <p:cNvSpPr/>
+              <p:nvPr/>
+            </p:nvSpPr>
+            <p:spPr bwMode="gray">
+              <a:xfrm>
+                <a:off x="6613634" y="2033752"/>
+                <a:ext cx="4966138" cy="360000"/>
+              </a:xfrm>
+              <a:prstGeom prst="roundRect">
+                <a:avLst>
+                  <a:gd name="adj" fmla="val 50000"/>
+                </a:avLst>
+              </a:prstGeom>
+              <a:solidFill>
+                <a:srgbClr val="FFC000"/>
+              </a:solidFill>
+              <a:ln w="6350" algn="ctr">
+                <a:solidFill>
+                  <a:schemeClr val="bg2">
+                    <a:lumMod val="75000"/>
+                  </a:schemeClr>
+                </a:solidFill>
+                <a:miter lim="800000"/>
+                <a:headEnd/>
+                <a:tailEnd/>
+              </a:ln>
+            </p:spPr>
+            <p:txBody>
+              <a:bodyPr lIns="90000" tIns="72000" rIns="90000" bIns="72000" rtlCol="0" anchor="ctr"/>
+              <a:lstStyle/>
+              <a:p>
+                <a:pPr marR="0" defTabSz="914400" eaLnBrk="1" fontAlgn="base" latinLnBrk="0" hangingPunct="1">
+                  <a:lnSpc>
+                    <a:spcPct val="100000"/>
+                  </a:lnSpc>
+                  <a:spcBef>
+                    <a:spcPct val="50000"/>
+                  </a:spcBef>
+                  <a:spcAft>
+                    <a:spcPct val="0"/>
+                  </a:spcAft>
+                  <a:buClr>
+                    <a:srgbClr val="F0AB00"/>
+                  </a:buClr>
+                  <a:buSzPct val="80000"/>
+                  <a:tabLst/>
+                </a:pPr>
+                <a:r>
+                  <a:rPr lang="de-DE" sz="1200" kern="0" noProof="0" dirty="0" err="1" smtClean="0">
+                    <a:latin typeface="Consolas" panose="020B0609020204030204" pitchFamily="49" charset="0"/>
+                    <a:ea typeface="Arial Unicode MS" pitchFamily="34" charset="-128"/>
+                    <a:cs typeface="Arial Unicode MS" pitchFamily="34" charset="-128"/>
+                  </a:rPr>
+                  <a:t>root</a:t>
+                </a:r>
+                <a:endParaRPr kumimoji="0" lang="de-DE" sz="1200" b="0" i="0" u="none" strike="noStrike" kern="0" cap="none" spc="0" normalizeH="0" baseline="0" noProof="0" dirty="0" smtClean="0">
+                  <a:effectLst/>
+                  <a:uLnTx/>
+                  <a:uFillTx/>
+                  <a:latin typeface="Consolas" panose="020B0609020204030204" pitchFamily="49" charset="0"/>
+                  <a:ea typeface="Arial Unicode MS" pitchFamily="34" charset="-128"/>
+                  <a:cs typeface="Arial Unicode MS" pitchFamily="34" charset="-128"/>
+                </a:endParaRPr>
+              </a:p>
+            </p:txBody>
+          </p:sp>
+          <p:sp>
+            <p:nvSpPr>
+              <p:cNvPr id="12" name="Rounded Rectangle 11"/>
+              <p:cNvSpPr/>
+              <p:nvPr/>
+            </p:nvSpPr>
+            <p:spPr bwMode="gray">
+              <a:xfrm>
+                <a:off x="7015654" y="2635664"/>
+                <a:ext cx="4564117" cy="360000"/>
+              </a:xfrm>
+              <a:prstGeom prst="roundRect">
+                <a:avLst>
+                  <a:gd name="adj" fmla="val 50000"/>
+                </a:avLst>
+              </a:prstGeom>
+              <a:solidFill>
+                <a:srgbClr val="FFC000"/>
+              </a:solidFill>
+              <a:ln w="6350" algn="ctr">
+                <a:solidFill>
+                  <a:schemeClr val="bg2">
+                    <a:lumMod val="75000"/>
+                  </a:schemeClr>
+                </a:solidFill>
+                <a:miter lim="800000"/>
+                <a:headEnd/>
+                <a:tailEnd/>
+              </a:ln>
+            </p:spPr>
+            <p:txBody>
+              <a:bodyPr lIns="90000" tIns="72000" rIns="90000" bIns="72000" rtlCol="0" anchor="ctr"/>
+              <a:lstStyle/>
+              <a:p>
+                <a:pPr marR="0" defTabSz="914400" eaLnBrk="1" fontAlgn="base" latinLnBrk="0" hangingPunct="1">
+                  <a:lnSpc>
+                    <a:spcPct val="100000"/>
+                  </a:lnSpc>
+                  <a:spcBef>
+                    <a:spcPct val="50000"/>
+                  </a:spcBef>
+                  <a:spcAft>
+                    <a:spcPct val="0"/>
+                  </a:spcAft>
+                  <a:buClr>
+                    <a:srgbClr val="F0AB00"/>
+                  </a:buClr>
+                  <a:buSzPct val="80000"/>
+                  <a:tabLst/>
+                </a:pPr>
+                <a:r>
+                  <a:rPr lang="de-DE" sz="1200" kern="0" dirty="0" err="1">
+                    <a:latin typeface="Consolas" panose="020B0609020204030204" pitchFamily="49" charset="0"/>
+                    <a:ea typeface="Arial Unicode MS" pitchFamily="34" charset="-128"/>
+                    <a:cs typeface="Arial Unicode MS" pitchFamily="34" charset="-128"/>
+                  </a:rPr>
+                  <a:t>c</a:t>
+                </a:r>
+                <a:r>
+                  <a:rPr lang="de-DE" sz="1200" kern="0" dirty="0" err="1" smtClean="0">
+                    <a:latin typeface="Consolas" panose="020B0609020204030204" pitchFamily="49" charset="0"/>
+                    <a:ea typeface="Arial Unicode MS" pitchFamily="34" charset="-128"/>
+                    <a:cs typeface="Arial Unicode MS" pitchFamily="34" charset="-128"/>
+                  </a:rPr>
+                  <a:t>urrent_observation</a:t>
+                </a:r>
+                <a:endParaRPr kumimoji="0" lang="de-DE" sz="1200" b="0" i="0" u="none" strike="noStrike" kern="0" cap="none" spc="0" normalizeH="0" baseline="0" noProof="0" dirty="0" smtClean="0">
+                  <a:effectLst/>
+                  <a:uLnTx/>
+                  <a:uFillTx/>
+                  <a:latin typeface="Consolas" panose="020B0609020204030204" pitchFamily="49" charset="0"/>
+                  <a:ea typeface="Arial Unicode MS" pitchFamily="34" charset="-128"/>
+                  <a:cs typeface="Arial Unicode MS" pitchFamily="34" charset="-128"/>
+                </a:endParaRPr>
+              </a:p>
+            </p:txBody>
+          </p:sp>
+          <p:sp>
+            <p:nvSpPr>
+              <p:cNvPr id="14" name="Rounded Rectangle 13"/>
+              <p:cNvSpPr/>
+              <p:nvPr/>
+            </p:nvSpPr>
+            <p:spPr bwMode="gray">
+              <a:xfrm>
+                <a:off x="7780282" y="3834622"/>
+                <a:ext cx="3799489" cy="360000"/>
+              </a:xfrm>
+              <a:prstGeom prst="roundRect">
+                <a:avLst>
+                  <a:gd name="adj" fmla="val 50000"/>
+                </a:avLst>
+              </a:prstGeom>
+              <a:solidFill>
+                <a:srgbClr val="FFC000"/>
+              </a:solidFill>
+              <a:ln w="6350" algn="ctr">
+                <a:solidFill>
+                  <a:schemeClr val="bg2">
+                    <a:lumMod val="75000"/>
+                  </a:schemeClr>
+                </a:solidFill>
+                <a:miter lim="800000"/>
+                <a:headEnd/>
+                <a:tailEnd/>
+              </a:ln>
+            </p:spPr>
+            <p:txBody>
+              <a:bodyPr lIns="90000" tIns="72000" rIns="90000" bIns="72000" rtlCol="0" anchor="ctr"/>
+              <a:lstStyle/>
+              <a:p>
+                <a:pPr defTabSz="914400" fontAlgn="base">
+                  <a:spcBef>
+                    <a:spcPct val="50000"/>
+                  </a:spcBef>
+                  <a:spcAft>
+                    <a:spcPct val="0"/>
+                  </a:spcAft>
+                  <a:buClr>
+                    <a:srgbClr val="F0AB00"/>
+                  </a:buClr>
+                  <a:buSzPct val="80000"/>
+                </a:pPr>
+                <a:r>
+                  <a:rPr lang="de-DE" sz="1200" kern="0" dirty="0" err="1">
+                    <a:latin typeface="Consolas" panose="020B0609020204030204" pitchFamily="49" charset="0"/>
+                    <a:ea typeface="Arial Unicode MS" pitchFamily="34" charset="-128"/>
+                    <a:cs typeface="Arial Unicode MS" pitchFamily="34" charset="-128"/>
+                  </a:rPr>
+                  <a:t>relative_humidity</a:t>
+                </a:r>
+                <a:endParaRPr kumimoji="0" lang="de-DE" sz="1200" b="0" i="0" u="none" strike="noStrike" kern="0" cap="none" spc="0" normalizeH="0" baseline="0" noProof="0" dirty="0" smtClean="0">
+                  <a:effectLst/>
+                  <a:uLnTx/>
+                  <a:uFillTx/>
+                  <a:latin typeface="Consolas" panose="020B0609020204030204" pitchFamily="49" charset="0"/>
+                  <a:ea typeface="Arial Unicode MS" pitchFamily="34" charset="-128"/>
+                  <a:cs typeface="Arial Unicode MS" pitchFamily="34" charset="-128"/>
+                </a:endParaRPr>
+              </a:p>
+            </p:txBody>
+          </p:sp>
+          <p:sp>
+            <p:nvSpPr>
+              <p:cNvPr id="15" name="Rounded Rectangle 14"/>
+              <p:cNvSpPr/>
+              <p:nvPr/>
+            </p:nvSpPr>
+            <p:spPr bwMode="gray">
+              <a:xfrm>
+                <a:off x="7780282" y="4431958"/>
+                <a:ext cx="3799489" cy="360000"/>
+              </a:xfrm>
+              <a:prstGeom prst="roundRect">
+                <a:avLst>
+                  <a:gd name="adj" fmla="val 50000"/>
+                </a:avLst>
+              </a:prstGeom>
+              <a:solidFill>
+                <a:srgbClr val="FFC000"/>
+              </a:solidFill>
+              <a:ln w="6350" algn="ctr">
+                <a:solidFill>
+                  <a:schemeClr val="bg2">
+                    <a:lumMod val="75000"/>
+                  </a:schemeClr>
+                </a:solidFill>
+                <a:miter lim="800000"/>
+                <a:headEnd/>
+                <a:tailEnd/>
+              </a:ln>
+            </p:spPr>
+            <p:txBody>
+              <a:bodyPr lIns="90000" tIns="72000" rIns="90000" bIns="72000" rtlCol="0" anchor="ctr"/>
+              <a:lstStyle/>
+              <a:p>
+                <a:pPr defTabSz="914400" fontAlgn="base">
+                  <a:spcBef>
+                    <a:spcPct val="50000"/>
+                  </a:spcBef>
+                  <a:spcAft>
+                    <a:spcPct val="0"/>
+                  </a:spcAft>
+                  <a:buClr>
+                    <a:srgbClr val="F0AB00"/>
+                  </a:buClr>
+                  <a:buSzPct val="80000"/>
+                </a:pPr>
+                <a:r>
+                  <a:rPr lang="de-DE" sz="1200" kern="0" dirty="0" err="1">
+                    <a:latin typeface="Consolas" panose="020B0609020204030204" pitchFamily="49" charset="0"/>
+                    <a:ea typeface="Arial Unicode MS" pitchFamily="34" charset="-128"/>
+                    <a:cs typeface="Arial Unicode MS" pitchFamily="34" charset="-128"/>
+                  </a:rPr>
+                  <a:t>wind_kph</a:t>
+                </a:r>
+                <a:endParaRPr kumimoji="0" lang="de-DE" sz="1200" b="0" i="0" u="none" strike="noStrike" kern="0" cap="none" spc="0" normalizeH="0" baseline="0" noProof="0" dirty="0" smtClean="0">
+                  <a:effectLst/>
+                  <a:uLnTx/>
+                  <a:uFillTx/>
+                  <a:latin typeface="Consolas" panose="020B0609020204030204" pitchFamily="49" charset="0"/>
+                  <a:ea typeface="Arial Unicode MS" pitchFamily="34" charset="-128"/>
+                  <a:cs typeface="Arial Unicode MS" pitchFamily="34" charset="-128"/>
+                </a:endParaRPr>
+              </a:p>
+            </p:txBody>
+          </p:sp>
+          <p:sp>
+            <p:nvSpPr>
+              <p:cNvPr id="16" name="Rounded Rectangle 15"/>
+              <p:cNvSpPr/>
+              <p:nvPr/>
+            </p:nvSpPr>
+            <p:spPr bwMode="gray">
+              <a:xfrm>
+                <a:off x="7780282" y="5029294"/>
+                <a:ext cx="3799489" cy="360000"/>
+              </a:xfrm>
+              <a:prstGeom prst="roundRect">
+                <a:avLst>
+                  <a:gd name="adj" fmla="val 50000"/>
+                </a:avLst>
+              </a:prstGeom>
+              <a:solidFill>
+                <a:srgbClr val="FFC000"/>
+              </a:solidFill>
+              <a:ln w="6350" algn="ctr">
+                <a:solidFill>
+                  <a:schemeClr val="bg2">
+                    <a:lumMod val="75000"/>
+                  </a:schemeClr>
+                </a:solidFill>
+                <a:miter lim="800000"/>
+                <a:headEnd/>
+                <a:tailEnd/>
+              </a:ln>
+            </p:spPr>
+            <p:txBody>
+              <a:bodyPr lIns="90000" tIns="72000" rIns="90000" bIns="72000" rtlCol="0" anchor="ctr"/>
+              <a:lstStyle/>
+              <a:p>
+                <a:pPr defTabSz="914400" fontAlgn="base">
+                  <a:spcBef>
+                    <a:spcPct val="50000"/>
+                  </a:spcBef>
+                  <a:spcAft>
+                    <a:spcPct val="0"/>
+                  </a:spcAft>
+                  <a:buClr>
+                    <a:srgbClr val="F0AB00"/>
+                  </a:buClr>
+                  <a:buSzPct val="80000"/>
+                </a:pPr>
+                <a:r>
+                  <a:rPr lang="de-DE" sz="1200" kern="0" dirty="0">
+                    <a:latin typeface="Consolas" panose="020B0609020204030204" pitchFamily="49" charset="0"/>
+                    <a:ea typeface="Arial Unicode MS" pitchFamily="34" charset="-128"/>
+                    <a:cs typeface="Arial Unicode MS" pitchFamily="34" charset="-128"/>
+                  </a:rPr>
+                  <a:t>precip_1hr_metric</a:t>
+                </a:r>
+                <a:endParaRPr kumimoji="0" lang="de-DE" sz="1200" b="0" i="0" u="none" strike="noStrike" kern="0" cap="none" spc="0" normalizeH="0" baseline="0" noProof="0" dirty="0" smtClean="0">
+                  <a:effectLst/>
+                  <a:uLnTx/>
+                  <a:uFillTx/>
+                  <a:latin typeface="Consolas" panose="020B0609020204030204" pitchFamily="49" charset="0"/>
+                  <a:ea typeface="Arial Unicode MS" pitchFamily="34" charset="-128"/>
+                  <a:cs typeface="Arial Unicode MS" pitchFamily="34" charset="-128"/>
+                </a:endParaRPr>
+              </a:p>
+            </p:txBody>
+          </p:sp>
+          <p:sp>
+            <p:nvSpPr>
+              <p:cNvPr id="13" name="Rounded Rectangle 12"/>
+              <p:cNvSpPr/>
+              <p:nvPr/>
+            </p:nvSpPr>
+            <p:spPr bwMode="gray">
+              <a:xfrm>
+                <a:off x="7780282" y="3235143"/>
+                <a:ext cx="3799489" cy="360000"/>
+              </a:xfrm>
+              <a:prstGeom prst="roundRect">
+                <a:avLst>
+                  <a:gd name="adj" fmla="val 50000"/>
+                </a:avLst>
+              </a:prstGeom>
+              <a:solidFill>
+                <a:srgbClr val="FFC000"/>
+              </a:solidFill>
+              <a:ln w="6350" algn="ctr">
+                <a:solidFill>
+                  <a:schemeClr val="bg2">
+                    <a:lumMod val="75000"/>
+                  </a:schemeClr>
+                </a:solidFill>
+                <a:miter lim="800000"/>
+                <a:headEnd/>
+                <a:tailEnd/>
+              </a:ln>
+            </p:spPr>
+            <p:txBody>
+              <a:bodyPr lIns="90000" tIns="72000" rIns="90000" bIns="72000" rtlCol="0" anchor="ctr"/>
+              <a:lstStyle/>
+              <a:p>
+                <a:pPr marR="0" defTabSz="914400" eaLnBrk="1" fontAlgn="base" latinLnBrk="0" hangingPunct="1">
+                  <a:lnSpc>
+                    <a:spcPct val="100000"/>
+                  </a:lnSpc>
+                  <a:spcBef>
+                    <a:spcPct val="50000"/>
+                  </a:spcBef>
+                  <a:spcAft>
+                    <a:spcPct val="0"/>
+                  </a:spcAft>
+                  <a:buClr>
+                    <a:srgbClr val="F0AB00"/>
+                  </a:buClr>
+                  <a:buSzPct val="80000"/>
+                  <a:tabLst/>
+                </a:pPr>
+                <a:r>
+                  <a:rPr lang="de-DE" sz="1200" kern="0" dirty="0" err="1">
+                    <a:latin typeface="Consolas" panose="020B0609020204030204" pitchFamily="49" charset="0"/>
+                    <a:ea typeface="Arial Unicode MS" pitchFamily="34" charset="-128"/>
+                    <a:cs typeface="Arial Unicode MS" pitchFamily="34" charset="-128"/>
+                  </a:rPr>
+                  <a:t>t</a:t>
+                </a:r>
+                <a:r>
+                  <a:rPr lang="de-DE" sz="1200" kern="0" dirty="0" err="1" smtClean="0">
+                    <a:latin typeface="Consolas" panose="020B0609020204030204" pitchFamily="49" charset="0"/>
+                    <a:ea typeface="Arial Unicode MS" pitchFamily="34" charset="-128"/>
+                    <a:cs typeface="Arial Unicode MS" pitchFamily="34" charset="-128"/>
+                  </a:rPr>
+                  <a:t>emp_c</a:t>
+                </a:r>
+                <a:endParaRPr kumimoji="0" lang="de-DE" sz="1200" b="0" i="0" u="none" strike="noStrike" kern="0" cap="none" spc="0" normalizeH="0" baseline="0" noProof="0" dirty="0" smtClean="0">
+                  <a:effectLst/>
+                  <a:uLnTx/>
+                  <a:uFillTx/>
+                  <a:latin typeface="Consolas" panose="020B0609020204030204" pitchFamily="49" charset="0"/>
+                  <a:ea typeface="Arial Unicode MS" pitchFamily="34" charset="-128"/>
+                  <a:cs typeface="Arial Unicode MS" pitchFamily="34" charset="-128"/>
+                </a:endParaRPr>
+              </a:p>
+            </p:txBody>
+          </p:sp>
+          <p:sp>
+            <p:nvSpPr>
+              <p:cNvPr id="28" name="Rectangle 27"/>
+              <p:cNvSpPr/>
+              <p:nvPr/>
+            </p:nvSpPr>
+            <p:spPr bwMode="gray">
+              <a:xfrm>
+                <a:off x="10381593" y="3235143"/>
+                <a:ext cx="890752" cy="360000"/>
+              </a:xfrm>
+              <a:prstGeom prst="rect">
+                <a:avLst/>
+              </a:prstGeom>
+              <a:solidFill>
+                <a:schemeClr val="accent1"/>
+              </a:solidFill>
+              <a:ln w="6350" algn="ctr">
+                <a:solidFill>
+                  <a:schemeClr val="bg2">
+                    <a:lumMod val="75000"/>
+                  </a:schemeClr>
+                </a:solidFill>
+                <a:miter lim="800000"/>
+                <a:headEnd/>
+                <a:tailEnd/>
+              </a:ln>
+            </p:spPr>
+            <p:txBody>
+              <a:bodyPr lIns="90000" tIns="72000" rIns="0" bIns="72000" rtlCol="0" anchor="ctr"/>
+              <a:lstStyle/>
+              <a:p>
+                <a:pPr marR="0" algn="ctr" defTabSz="914400" eaLnBrk="1" fontAlgn="base" latinLnBrk="0" hangingPunct="1">
+                  <a:lnSpc>
+                    <a:spcPct val="100000"/>
+                  </a:lnSpc>
+                  <a:spcBef>
+                    <a:spcPct val="50000"/>
+                  </a:spcBef>
+                  <a:spcAft>
+                    <a:spcPct val="0"/>
+                  </a:spcAft>
+                  <a:buClr>
+                    <a:srgbClr val="F0AB00"/>
+                  </a:buClr>
+                  <a:buSzPct val="80000"/>
+                  <a:tabLst/>
+                </a:pPr>
+                <a:r>
+                  <a:rPr kumimoji="0" lang="de-DE" sz="1200" b="0" i="0" u="none" strike="noStrike" kern="0" cap="none" spc="0" normalizeH="0" baseline="0" noProof="0" dirty="0" smtClean="0">
+                    <a:effectLst/>
+                    <a:uLnTx/>
+                    <a:uFillTx/>
+                    <a:latin typeface="Consolas" panose="020B0609020204030204" pitchFamily="49" charset="0"/>
+                    <a:ea typeface="Arial Unicode MS" pitchFamily="34" charset="-128"/>
+                    <a:cs typeface="Arial Unicode MS" pitchFamily="34" charset="-128"/>
+                  </a:rPr>
+                  <a:t>3.5</a:t>
+                </a:r>
+                <a:endParaRPr kumimoji="0" lang="de-DE" sz="1200" b="0" i="0" u="none" strike="noStrike" kern="0" cap="none" spc="0" normalizeH="0" baseline="0" noProof="0" dirty="0" smtClean="0">
+                  <a:effectLst/>
+                  <a:uLnTx/>
+                  <a:uFillTx/>
+                  <a:latin typeface="Consolas" panose="020B0609020204030204" pitchFamily="49" charset="0"/>
+                  <a:ea typeface="Arial Unicode MS" pitchFamily="34" charset="-128"/>
+                  <a:cs typeface="Arial Unicode MS" pitchFamily="34" charset="-128"/>
+                </a:endParaRPr>
+              </a:p>
+            </p:txBody>
+          </p:sp>
+          <p:sp>
+            <p:nvSpPr>
+              <p:cNvPr id="35" name="Rectangle 34"/>
+              <p:cNvSpPr/>
+              <p:nvPr/>
+            </p:nvSpPr>
+            <p:spPr bwMode="gray">
+              <a:xfrm>
+                <a:off x="10381593" y="3835675"/>
+                <a:ext cx="890752" cy="360000"/>
+              </a:xfrm>
+              <a:prstGeom prst="rect">
+                <a:avLst/>
+              </a:prstGeom>
+              <a:solidFill>
+                <a:schemeClr val="accent1"/>
+              </a:solidFill>
+              <a:ln w="6350" algn="ctr">
+                <a:solidFill>
+                  <a:schemeClr val="bg2">
+                    <a:lumMod val="75000"/>
+                  </a:schemeClr>
+                </a:solidFill>
+                <a:miter lim="800000"/>
+                <a:headEnd/>
+                <a:tailEnd/>
+              </a:ln>
+            </p:spPr>
+            <p:txBody>
+              <a:bodyPr lIns="72000" tIns="72000" rIns="0" bIns="72000" rtlCol="0" anchor="ctr"/>
+              <a:lstStyle/>
+              <a:p>
+                <a:pPr marR="0" algn="ctr" defTabSz="914400" eaLnBrk="1" fontAlgn="base" latinLnBrk="0" hangingPunct="1">
+                  <a:lnSpc>
+                    <a:spcPct val="100000"/>
+                  </a:lnSpc>
+                  <a:spcBef>
+                    <a:spcPct val="50000"/>
+                  </a:spcBef>
+                  <a:spcAft>
+                    <a:spcPct val="0"/>
+                  </a:spcAft>
+                  <a:buClr>
+                    <a:srgbClr val="F0AB00"/>
+                  </a:buClr>
+                  <a:buSzPct val="80000"/>
+                  <a:tabLst/>
+                </a:pPr>
+                <a:r>
+                  <a:rPr kumimoji="0" lang="de-DE" sz="1200" b="0" i="0" u="none" strike="noStrike" kern="0" cap="none" spc="0" normalizeH="0" baseline="0" noProof="0" dirty="0" smtClean="0">
+                    <a:effectLst/>
+                    <a:uLnTx/>
+                    <a:uFillTx/>
+                    <a:latin typeface="Consolas" panose="020B0609020204030204" pitchFamily="49" charset="0"/>
+                    <a:ea typeface="Arial Unicode MS" pitchFamily="34" charset="-128"/>
+                    <a:cs typeface="Arial Unicode MS" pitchFamily="34" charset="-128"/>
+                  </a:rPr>
+                  <a:t>99%</a:t>
+                </a:r>
+                <a:endParaRPr kumimoji="0" lang="de-DE" sz="1200" b="0" i="0" u="none" strike="noStrike" kern="0" cap="none" spc="0" normalizeH="0" baseline="0" noProof="0" dirty="0" smtClean="0">
+                  <a:effectLst/>
+                  <a:uLnTx/>
+                  <a:uFillTx/>
+                  <a:latin typeface="Consolas" panose="020B0609020204030204" pitchFamily="49" charset="0"/>
+                  <a:ea typeface="Arial Unicode MS" pitchFamily="34" charset="-128"/>
+                  <a:cs typeface="Arial Unicode MS" pitchFamily="34" charset="-128"/>
+                </a:endParaRPr>
+              </a:p>
+            </p:txBody>
+          </p:sp>
+          <p:sp>
+            <p:nvSpPr>
+              <p:cNvPr id="36" name="Rectangle 35"/>
+              <p:cNvSpPr/>
+              <p:nvPr/>
+            </p:nvSpPr>
+            <p:spPr bwMode="gray">
+              <a:xfrm>
+                <a:off x="10381593" y="4427271"/>
+                <a:ext cx="890752" cy="360000"/>
+              </a:xfrm>
+              <a:prstGeom prst="rect">
+                <a:avLst/>
+              </a:prstGeom>
+              <a:solidFill>
+                <a:schemeClr val="accent1"/>
+              </a:solidFill>
+              <a:ln w="6350" algn="ctr">
+                <a:solidFill>
+                  <a:schemeClr val="bg2">
+                    <a:lumMod val="75000"/>
+                  </a:schemeClr>
+                </a:solidFill>
+                <a:miter lim="800000"/>
+                <a:headEnd/>
+                <a:tailEnd/>
+              </a:ln>
+            </p:spPr>
+            <p:txBody>
+              <a:bodyPr lIns="72000" tIns="72000" rIns="0" bIns="72000" rtlCol="0" anchor="ctr"/>
+              <a:lstStyle/>
+              <a:p>
+                <a:pPr marR="0" algn="ctr" defTabSz="914400" eaLnBrk="1" fontAlgn="base" latinLnBrk="0" hangingPunct="1">
+                  <a:lnSpc>
+                    <a:spcPct val="100000"/>
+                  </a:lnSpc>
+                  <a:spcBef>
+                    <a:spcPct val="50000"/>
+                  </a:spcBef>
+                  <a:spcAft>
+                    <a:spcPct val="0"/>
+                  </a:spcAft>
+                  <a:buClr>
+                    <a:srgbClr val="F0AB00"/>
+                  </a:buClr>
+                  <a:buSzPct val="80000"/>
+                  <a:tabLst/>
+                </a:pPr>
+                <a:r>
+                  <a:rPr kumimoji="0" lang="de-DE" sz="1200" b="0" i="0" u="none" strike="noStrike" kern="0" cap="none" spc="0" normalizeH="0" baseline="0" noProof="0" dirty="0" smtClean="0">
+                    <a:effectLst/>
+                    <a:uLnTx/>
+                    <a:uFillTx/>
+                    <a:latin typeface="Consolas" panose="020B0609020204030204" pitchFamily="49" charset="0"/>
+                    <a:ea typeface="Arial Unicode MS" pitchFamily="34" charset="-128"/>
+                    <a:cs typeface="Arial Unicode MS" pitchFamily="34" charset="-128"/>
+                  </a:rPr>
+                  <a:t>7.2</a:t>
+                </a:r>
+                <a:endParaRPr kumimoji="0" lang="de-DE" sz="1200" b="0" i="0" u="none" strike="noStrike" kern="0" cap="none" spc="0" normalizeH="0" baseline="0" noProof="0" dirty="0" smtClean="0">
+                  <a:effectLst/>
+                  <a:uLnTx/>
+                  <a:uFillTx/>
+                  <a:latin typeface="Consolas" panose="020B0609020204030204" pitchFamily="49" charset="0"/>
+                  <a:ea typeface="Arial Unicode MS" pitchFamily="34" charset="-128"/>
+                  <a:cs typeface="Arial Unicode MS" pitchFamily="34" charset="-128"/>
+                </a:endParaRPr>
+              </a:p>
+            </p:txBody>
+          </p:sp>
+          <p:sp>
+            <p:nvSpPr>
+              <p:cNvPr id="37" name="Rectangle 36"/>
+              <p:cNvSpPr/>
+              <p:nvPr/>
+            </p:nvSpPr>
+            <p:spPr bwMode="gray">
+              <a:xfrm>
+                <a:off x="10381593" y="5029294"/>
+                <a:ext cx="890752" cy="360000"/>
+              </a:xfrm>
+              <a:prstGeom prst="rect">
+                <a:avLst/>
+              </a:prstGeom>
+              <a:solidFill>
+                <a:schemeClr val="accent1"/>
+              </a:solidFill>
+              <a:ln w="6350" algn="ctr">
+                <a:solidFill>
+                  <a:schemeClr val="bg2">
+                    <a:lumMod val="75000"/>
+                  </a:schemeClr>
+                </a:solidFill>
+                <a:miter lim="800000"/>
+                <a:headEnd/>
+                <a:tailEnd/>
+              </a:ln>
+            </p:spPr>
+            <p:txBody>
+              <a:bodyPr lIns="72000" tIns="72000" rIns="0" bIns="72000" rtlCol="0" anchor="ctr"/>
+              <a:lstStyle/>
+              <a:p>
+                <a:pPr marR="0" algn="ctr" defTabSz="914400" eaLnBrk="1" fontAlgn="base" latinLnBrk="0" hangingPunct="1">
+                  <a:lnSpc>
+                    <a:spcPct val="100000"/>
+                  </a:lnSpc>
+                  <a:spcBef>
+                    <a:spcPct val="50000"/>
+                  </a:spcBef>
+                  <a:spcAft>
+                    <a:spcPct val="0"/>
+                  </a:spcAft>
+                  <a:buClr>
+                    <a:srgbClr val="F0AB00"/>
+                  </a:buClr>
+                  <a:buSzPct val="80000"/>
+                  <a:tabLst/>
+                </a:pPr>
+                <a:r>
+                  <a:rPr kumimoji="0" lang="de-DE" sz="1200" b="0" i="0" u="none" strike="noStrike" kern="0" cap="none" spc="0" normalizeH="0" baseline="0" noProof="0" dirty="0" smtClean="0">
+                    <a:effectLst/>
+                    <a:uLnTx/>
+                    <a:uFillTx/>
+                    <a:latin typeface="Consolas" panose="020B0609020204030204" pitchFamily="49" charset="0"/>
+                    <a:ea typeface="Arial Unicode MS" pitchFamily="34" charset="-128"/>
+                    <a:cs typeface="Arial Unicode MS" pitchFamily="34" charset="-128"/>
+                  </a:rPr>
+                  <a:t>20</a:t>
+                </a:r>
+                <a:endParaRPr kumimoji="0" lang="de-DE" sz="1200" b="0" i="0" u="none" strike="noStrike" kern="0" cap="none" spc="0" normalizeH="0" baseline="0" noProof="0" dirty="0" smtClean="0">
+                  <a:effectLst/>
+                  <a:uLnTx/>
+                  <a:uFillTx/>
+                  <a:latin typeface="Consolas" panose="020B0609020204030204" pitchFamily="49" charset="0"/>
+                  <a:ea typeface="Arial Unicode MS" pitchFamily="34" charset="-128"/>
+                  <a:cs typeface="Arial Unicode MS" pitchFamily="34" charset="-128"/>
+                </a:endParaRPr>
+              </a:p>
+            </p:txBody>
+          </p:sp>
+        </p:grpSp>
+      </p:grpSp>
+      <p:sp>
+        <p:nvSpPr>
+          <p:cNvPr id="75" name="TextBox 74"/>
+          <p:cNvSpPr txBox="1"/>
+          <p:nvPr/>
+        </p:nvSpPr>
+        <p:spPr>
+          <a:xfrm>
+            <a:off x="7953703" y="5533807"/>
+            <a:ext cx="1221827" cy="276999"/>
+          </a:xfrm>
+          <a:prstGeom prst="rect">
+            <a:avLst/>
+          </a:prstGeom>
+          <a:noFill/>
+        </p:spPr>
+        <p:txBody>
+          <a:bodyPr wrap="square" lIns="0" tIns="0" rIns="0" bIns="0" rtlCol="0">
+            <a:spAutoFit/>
+          </a:bodyPr>
+          <a:lstStyle/>
+          <a:p>
+            <a:pPr fontAlgn="base">
+              <a:spcBef>
+                <a:spcPts val="600"/>
+              </a:spcBef>
+              <a:spcAft>
+                <a:spcPct val="0"/>
+              </a:spcAft>
+              <a:buClr>
+                <a:srgbClr val="F0AB00"/>
+              </a:buClr>
+              <a:buSzPct val="80000"/>
+            </a:pPr>
+            <a:r>
+              <a:rPr lang="de-DE" sz="1800" kern="0" dirty="0" smtClean="0">
+                <a:ea typeface="Arial Unicode MS" pitchFamily="34" charset="-128"/>
+                <a:cs typeface="Arial Unicode MS" pitchFamily="34" charset="-128"/>
+              </a:rPr>
+              <a:t>…</a:t>
+            </a:r>
+            <a:endParaRPr lang="de-DE" sz="1800" kern="0" dirty="0" smtClean="0">
+              <a:ea typeface="Arial Unicode MS" pitchFamily="34" charset="-128"/>
+              <a:cs typeface="Arial Unicode MS" pitchFamily="34" charset="-128"/>
+            </a:endParaRPr>
+          </a:p>
+        </p:txBody>
+      </p:sp>
     </p:spTree>
     <p:extLst>
       <p:ext uri="{BB962C8B-B14F-4D97-AF65-F5344CB8AC3E}">
@@ -11047,8 +11730,8 @@
 </p:sld>
 </file>
 
-<file path=ppt/slides/slide8.xml><?xml version="1.0" encoding="utf-8"?>
-<p:sld xmlns:a="http://schemas.openxmlformats.org/drawingml/2006/main" xmlns:r="http://schemas.openxmlformats.org/officeDocument/2006/relationships" xmlns:p="http://schemas.openxmlformats.org/presentationml/2006/main">
+<file path=ppt/slides/slide7.xml><?xml version="1.0" encoding="utf-8"?>
+<p:sld xmlns:a="http://schemas.openxmlformats.org/drawingml/2006/main" xmlns:r="http://schemas.openxmlformats.org/officeDocument/2006/relationships" xmlns:p="http://schemas.openxmlformats.org/presentationml/2006/main" show="0">
   <p:cSld>
     <p:spTree>
       <p:nvGrpSpPr>
@@ -11089,384 +11772,163 @@
       </p:sp>
       <p:sp>
         <p:nvSpPr>
-          <p:cNvPr id="6" name="TextBox 5"/>
-          <p:cNvSpPr txBox="1"/>
-          <p:nvPr/>
-        </p:nvSpPr>
-        <p:spPr>
-          <a:xfrm>
-            <a:off x="5382826" y="1436473"/>
-            <a:ext cx="6486374" cy="1936084"/>
-          </a:xfrm>
-          <a:prstGeom prst="rect">
-            <a:avLst/>
-          </a:prstGeom>
-          <a:solidFill>
-            <a:srgbClr val="F7F7F7"/>
-          </a:solidFill>
-          <a:ln>
-            <a:solidFill>
-              <a:schemeClr val="tx1"/>
-            </a:solidFill>
-            <a:prstDash val="dash"/>
-          </a:ln>
-        </p:spPr>
-        <p:txBody>
-          <a:bodyPr wrap="square" lIns="90000" tIns="90000" rIns="90000" bIns="90000" rtlCol="0">
-            <a:spAutoFit/>
-          </a:bodyPr>
+          <p:cNvPr id="4" name="Text Placeholder 3"/>
+          <p:cNvSpPr>
+            <a:spLocks noGrp="1"/>
+          </p:cNvSpPr>
+          <p:nvPr>
+            <p:ph type="body" sz="quarter" idx="11"/>
+          </p:nvPr>
+        </p:nvSpPr>
+        <p:spPr/>
+        <p:txBody>
+          <a:bodyPr/>
           <a:lstStyle/>
           <a:p>
-            <a:pPr fontAlgn="base">
-              <a:spcBef>
-                <a:spcPts val="600"/>
-              </a:spcBef>
-              <a:spcAft>
-                <a:spcPct val="0"/>
-              </a:spcAft>
-              <a:buClr>
-                <a:srgbClr val="F0AB00"/>
-              </a:buClr>
-              <a:buSzPct val="80000"/>
-            </a:pPr>
-            <a:r>
-              <a:rPr lang="de-DE" sz="1200" kern="0" dirty="0">
-                <a:latin typeface="Consolas" panose="020B0609020204030204" pitchFamily="49" charset="0"/>
-                <a:ea typeface="Arial Unicode MS" pitchFamily="34" charset="-128"/>
-                <a:cs typeface="Arial Unicode MS" pitchFamily="34" charset="-128"/>
-              </a:rPr>
-              <a:t>&lt;</a:t>
-            </a:r>
-            <a:r>
-              <a:rPr lang="de-DE" sz="1200" b="1" kern="0" dirty="0">
-                <a:solidFill>
-                  <a:srgbClr val="0070C0"/>
-                </a:solidFill>
-                <a:latin typeface="Consolas" panose="020B0609020204030204" pitchFamily="49" charset="0"/>
-                <a:ea typeface="Arial Unicode MS" pitchFamily="34" charset="-128"/>
-                <a:cs typeface="Arial Unicode MS" pitchFamily="34" charset="-128"/>
-              </a:rPr>
-              <a:t>Image</a:t>
-            </a:r>
-          </a:p>
-          <a:p>
-            <a:pPr fontAlgn="base">
-              <a:spcBef>
-                <a:spcPts val="600"/>
-              </a:spcBef>
-              <a:spcAft>
-                <a:spcPct val="0"/>
-              </a:spcAft>
-              <a:buClr>
-                <a:srgbClr val="F0AB00"/>
-              </a:buClr>
-              <a:buSzPct val="80000"/>
-            </a:pPr>
-            <a:r>
-              <a:rPr lang="de-DE" sz="1200" kern="0" dirty="0">
-                <a:latin typeface="Consolas" panose="020B0609020204030204" pitchFamily="49" charset="0"/>
-                <a:ea typeface="Arial Unicode MS" pitchFamily="34" charset="-128"/>
-                <a:cs typeface="Arial Unicode MS" pitchFamily="34" charset="-128"/>
-              </a:rPr>
-              <a:t>    </a:t>
-            </a:r>
-            <a:r>
-              <a:rPr lang="de-DE" sz="1200" b="1" kern="0" dirty="0" err="1">
-                <a:solidFill>
-                  <a:srgbClr val="00B0F0"/>
-                </a:solidFill>
-                <a:latin typeface="Consolas" panose="020B0609020204030204" pitchFamily="49" charset="0"/>
-                <a:ea typeface="Arial Unicode MS" pitchFamily="34" charset="-128"/>
-                <a:cs typeface="Arial Unicode MS" pitchFamily="34" charset="-128"/>
-              </a:rPr>
-              <a:t>src</a:t>
-            </a:r>
-            <a:r>
-              <a:rPr lang="de-DE" sz="1200" kern="0" dirty="0">
-                <a:latin typeface="Consolas" panose="020B0609020204030204" pitchFamily="49" charset="0"/>
-                <a:ea typeface="Arial Unicode MS" pitchFamily="34" charset="-128"/>
-                <a:cs typeface="Arial Unicode MS" pitchFamily="34" charset="-128"/>
-              </a:rPr>
-              <a:t>="{</a:t>
-            </a:r>
-          </a:p>
-          <a:p>
-            <a:pPr fontAlgn="base">
-              <a:spcBef>
-                <a:spcPts val="600"/>
-              </a:spcBef>
-              <a:spcAft>
-                <a:spcPct val="0"/>
-              </a:spcAft>
-              <a:buClr>
-                <a:srgbClr val="F0AB00"/>
-              </a:buClr>
-              <a:buSzPct val="80000"/>
-            </a:pPr>
-            <a:r>
-              <a:rPr lang="de-DE" sz="1200" kern="0" dirty="0">
-                <a:latin typeface="Consolas" panose="020B0609020204030204" pitchFamily="49" charset="0"/>
-                <a:ea typeface="Arial Unicode MS" pitchFamily="34" charset="-128"/>
-                <a:cs typeface="Arial Unicode MS" pitchFamily="34" charset="-128"/>
-              </a:rPr>
-              <a:t>        </a:t>
-            </a:r>
-            <a:r>
-              <a:rPr lang="de-DE" sz="1200" kern="0" dirty="0" err="1">
-                <a:latin typeface="Consolas" panose="020B0609020204030204" pitchFamily="49" charset="0"/>
-                <a:ea typeface="Arial Unicode MS" pitchFamily="34" charset="-128"/>
-                <a:cs typeface="Arial Unicode MS" pitchFamily="34" charset="-128"/>
-              </a:rPr>
-              <a:t>path</a:t>
-            </a:r>
-            <a:r>
-              <a:rPr lang="de-DE" sz="1200" kern="0" dirty="0">
-                <a:latin typeface="Consolas" panose="020B0609020204030204" pitchFamily="49" charset="0"/>
-                <a:ea typeface="Arial Unicode MS" pitchFamily="34" charset="-128"/>
-                <a:cs typeface="Arial Unicode MS" pitchFamily="34" charset="-128"/>
-              </a:rPr>
-              <a:t>: '</a:t>
-            </a:r>
-            <a:r>
-              <a:rPr lang="de-DE" sz="1200" kern="0" dirty="0" err="1">
-                <a:latin typeface="Consolas" panose="020B0609020204030204" pitchFamily="49" charset="0"/>
-                <a:ea typeface="Arial Unicode MS" pitchFamily="34" charset="-128"/>
-                <a:cs typeface="Arial Unicode MS" pitchFamily="34" charset="-128"/>
-              </a:rPr>
-              <a:t>data</a:t>
-            </a:r>
-            <a:r>
-              <a:rPr lang="de-DE" sz="1200" kern="0" dirty="0">
-                <a:latin typeface="Consolas" panose="020B0609020204030204" pitchFamily="49" charset="0"/>
-                <a:ea typeface="Arial Unicode MS" pitchFamily="34" charset="-128"/>
-                <a:cs typeface="Arial Unicode MS" pitchFamily="34" charset="-128"/>
-              </a:rPr>
-              <a:t>&gt;/</a:t>
-            </a:r>
-            <a:r>
-              <a:rPr lang="de-DE" sz="1200" kern="0" dirty="0" err="1">
-                <a:latin typeface="Consolas" panose="020B0609020204030204" pitchFamily="49" charset="0"/>
-                <a:ea typeface="Arial Unicode MS" pitchFamily="34" charset="-128"/>
-                <a:cs typeface="Arial Unicode MS" pitchFamily="34" charset="-128"/>
-              </a:rPr>
-              <a:t>current_observation</a:t>
-            </a:r>
-            <a:r>
-              <a:rPr lang="de-DE" sz="1200" kern="0" dirty="0">
-                <a:latin typeface="Consolas" panose="020B0609020204030204" pitchFamily="49" charset="0"/>
-                <a:ea typeface="Arial Unicode MS" pitchFamily="34" charset="-128"/>
-                <a:cs typeface="Arial Unicode MS" pitchFamily="34" charset="-128"/>
-              </a:rPr>
-              <a:t>/</a:t>
-            </a:r>
-            <a:r>
-              <a:rPr lang="de-DE" sz="1200" kern="0" dirty="0" err="1">
-                <a:latin typeface="Consolas" panose="020B0609020204030204" pitchFamily="49" charset="0"/>
-                <a:ea typeface="Arial Unicode MS" pitchFamily="34" charset="-128"/>
-                <a:cs typeface="Arial Unicode MS" pitchFamily="34" charset="-128"/>
-              </a:rPr>
-              <a:t>icon</a:t>
-            </a:r>
-            <a:r>
-              <a:rPr lang="de-DE" sz="1200" kern="0" dirty="0">
-                <a:latin typeface="Consolas" panose="020B0609020204030204" pitchFamily="49" charset="0"/>
-                <a:ea typeface="Arial Unicode MS" pitchFamily="34" charset="-128"/>
-                <a:cs typeface="Arial Unicode MS" pitchFamily="34" charset="-128"/>
-              </a:rPr>
-              <a:t>',</a:t>
-            </a:r>
-          </a:p>
-          <a:p>
-            <a:pPr fontAlgn="base">
-              <a:spcBef>
-                <a:spcPts val="600"/>
-              </a:spcBef>
-              <a:spcAft>
-                <a:spcPct val="0"/>
-              </a:spcAft>
-              <a:buClr>
-                <a:srgbClr val="F0AB00"/>
-              </a:buClr>
-              <a:buSzPct val="80000"/>
-            </a:pPr>
-            <a:r>
-              <a:rPr lang="de-DE" sz="1200" kern="0" dirty="0">
-                <a:latin typeface="Consolas" panose="020B0609020204030204" pitchFamily="49" charset="0"/>
-                <a:ea typeface="Arial Unicode MS" pitchFamily="34" charset="-128"/>
-                <a:cs typeface="Arial Unicode MS" pitchFamily="34" charset="-128"/>
-              </a:rPr>
-              <a:t>        </a:t>
-            </a:r>
-            <a:r>
-              <a:rPr lang="de-DE" sz="1200" kern="0" dirty="0" err="1">
-                <a:latin typeface="Consolas" panose="020B0609020204030204" pitchFamily="49" charset="0"/>
-                <a:ea typeface="Arial Unicode MS" pitchFamily="34" charset="-128"/>
-                <a:cs typeface="Arial Unicode MS" pitchFamily="34" charset="-128"/>
-              </a:rPr>
-              <a:t>formatter</a:t>
-            </a:r>
-            <a:r>
-              <a:rPr lang="de-DE" sz="1200" kern="0" dirty="0">
-                <a:latin typeface="Consolas" panose="020B0609020204030204" pitchFamily="49" charset="0"/>
-                <a:ea typeface="Arial Unicode MS" pitchFamily="34" charset="-128"/>
-                <a:cs typeface="Arial Unicode MS" pitchFamily="34" charset="-128"/>
-              </a:rPr>
-              <a:t>: '</a:t>
-            </a:r>
-            <a:r>
-              <a:rPr lang="de-DE" sz="1200" kern="0" dirty="0" err="1">
-                <a:latin typeface="Consolas" panose="020B0609020204030204" pitchFamily="49" charset="0"/>
-                <a:ea typeface="Arial Unicode MS" pitchFamily="34" charset="-128"/>
-                <a:cs typeface="Arial Unicode MS" pitchFamily="34" charset="-128"/>
-              </a:rPr>
-              <a:t>hss.weather.view.Formatter.WeatherIcon</a:t>
-            </a:r>
-            <a:r>
-              <a:rPr lang="de-DE" sz="1200" kern="0" dirty="0">
-                <a:latin typeface="Consolas" panose="020B0609020204030204" pitchFamily="49" charset="0"/>
-                <a:ea typeface="Arial Unicode MS" pitchFamily="34" charset="-128"/>
-                <a:cs typeface="Arial Unicode MS" pitchFamily="34" charset="-128"/>
-              </a:rPr>
-              <a:t>'</a:t>
-            </a:r>
-          </a:p>
-          <a:p>
-            <a:pPr fontAlgn="base">
-              <a:spcBef>
-                <a:spcPts val="600"/>
-              </a:spcBef>
-              <a:spcAft>
-                <a:spcPct val="0"/>
-              </a:spcAft>
-              <a:buClr>
-                <a:srgbClr val="F0AB00"/>
-              </a:buClr>
-              <a:buSzPct val="80000"/>
-            </a:pPr>
-            <a:r>
-              <a:rPr lang="de-DE" sz="1200" kern="0" dirty="0">
-                <a:latin typeface="Consolas" panose="020B0609020204030204" pitchFamily="49" charset="0"/>
-                <a:ea typeface="Arial Unicode MS" pitchFamily="34" charset="-128"/>
-                <a:cs typeface="Arial Unicode MS" pitchFamily="34" charset="-128"/>
-              </a:rPr>
-              <a:t>    }"</a:t>
-            </a:r>
-          </a:p>
-          <a:p>
-            <a:pPr fontAlgn="base">
-              <a:spcBef>
-                <a:spcPts val="600"/>
-              </a:spcBef>
-              <a:spcAft>
-                <a:spcPct val="0"/>
-              </a:spcAft>
-              <a:buClr>
-                <a:srgbClr val="F0AB00"/>
-              </a:buClr>
-              <a:buSzPct val="80000"/>
-            </a:pPr>
-            <a:r>
-              <a:rPr lang="de-DE" sz="1200" kern="0" dirty="0">
-                <a:latin typeface="Consolas" panose="020B0609020204030204" pitchFamily="49" charset="0"/>
-                <a:ea typeface="Arial Unicode MS" pitchFamily="34" charset="-128"/>
-                <a:cs typeface="Arial Unicode MS" pitchFamily="34" charset="-128"/>
-              </a:rPr>
-              <a:t>    </a:t>
-            </a:r>
-            <a:r>
-              <a:rPr lang="de-DE" sz="1200" b="1" kern="0" dirty="0" err="1">
-                <a:solidFill>
-                  <a:srgbClr val="00B0F0"/>
-                </a:solidFill>
-                <a:latin typeface="Consolas" panose="020B0609020204030204" pitchFamily="49" charset="0"/>
-                <a:ea typeface="Arial Unicode MS" pitchFamily="34" charset="-128"/>
-                <a:cs typeface="Arial Unicode MS" pitchFamily="34" charset="-128"/>
-              </a:rPr>
-              <a:t>class</a:t>
-            </a:r>
-            <a:r>
-              <a:rPr lang="de-DE" sz="1200" kern="0" dirty="0">
-                <a:latin typeface="Consolas" panose="020B0609020204030204" pitchFamily="49" charset="0"/>
-                <a:ea typeface="Arial Unicode MS" pitchFamily="34" charset="-128"/>
-                <a:cs typeface="Arial Unicode MS" pitchFamily="34" charset="-128"/>
-              </a:rPr>
-              <a:t>="</a:t>
-            </a:r>
-            <a:r>
-              <a:rPr lang="de-DE" sz="1200" kern="0" dirty="0" err="1">
-                <a:latin typeface="Consolas" panose="020B0609020204030204" pitchFamily="49" charset="0"/>
-                <a:ea typeface="Arial Unicode MS" pitchFamily="34" charset="-128"/>
-                <a:cs typeface="Arial Unicode MS" pitchFamily="34" charset="-128"/>
-              </a:rPr>
-              <a:t>WeatherIcon</a:t>
-            </a:r>
-            <a:r>
-              <a:rPr lang="de-DE" sz="1200" kern="0" dirty="0">
-                <a:latin typeface="Consolas" panose="020B0609020204030204" pitchFamily="49" charset="0"/>
-                <a:ea typeface="Arial Unicode MS" pitchFamily="34" charset="-128"/>
-                <a:cs typeface="Arial Unicode MS" pitchFamily="34" charset="-128"/>
-              </a:rPr>
-              <a:t>" </a:t>
-            </a:r>
-          </a:p>
-          <a:p>
-            <a:pPr fontAlgn="base">
-              <a:spcBef>
-                <a:spcPts val="600"/>
-              </a:spcBef>
-              <a:spcAft>
-                <a:spcPct val="0"/>
-              </a:spcAft>
-              <a:buClr>
-                <a:srgbClr val="F0AB00"/>
-              </a:buClr>
-              <a:buSzPct val="80000"/>
-            </a:pPr>
-            <a:r>
-              <a:rPr lang="de-DE" sz="1200" kern="0" dirty="0">
-                <a:latin typeface="Consolas" panose="020B0609020204030204" pitchFamily="49" charset="0"/>
-                <a:ea typeface="Arial Unicode MS" pitchFamily="34" charset="-128"/>
-                <a:cs typeface="Arial Unicode MS" pitchFamily="34" charset="-128"/>
-              </a:rPr>
-              <a:t>    </a:t>
-            </a:r>
-            <a:r>
-              <a:rPr lang="de-DE" sz="1200" b="1" kern="0" dirty="0" err="1">
-                <a:solidFill>
-                  <a:srgbClr val="00B0F0"/>
-                </a:solidFill>
-                <a:latin typeface="Consolas" panose="020B0609020204030204" pitchFamily="49" charset="0"/>
-                <a:ea typeface="Arial Unicode MS" pitchFamily="34" charset="-128"/>
-                <a:cs typeface="Arial Unicode MS" pitchFamily="34" charset="-128"/>
-              </a:rPr>
-              <a:t>id</a:t>
-            </a:r>
-            <a:r>
-              <a:rPr lang="de-DE" sz="1200" kern="0" dirty="0">
-                <a:latin typeface="Consolas" panose="020B0609020204030204" pitchFamily="49" charset="0"/>
-                <a:ea typeface="Arial Unicode MS" pitchFamily="34" charset="-128"/>
-                <a:cs typeface="Arial Unicode MS" pitchFamily="34" charset="-128"/>
-              </a:rPr>
-              <a:t>="</a:t>
-            </a:r>
-            <a:r>
-              <a:rPr lang="de-DE" sz="1200" kern="0" dirty="0" err="1" smtClean="0">
-                <a:latin typeface="Consolas" panose="020B0609020204030204" pitchFamily="49" charset="0"/>
-                <a:ea typeface="Arial Unicode MS" pitchFamily="34" charset="-128"/>
-                <a:cs typeface="Arial Unicode MS" pitchFamily="34" charset="-128"/>
-              </a:rPr>
-              <a:t>WeatherIcon</a:t>
-            </a:r>
-            <a:r>
-              <a:rPr lang="de-DE" sz="1200" kern="0" dirty="0" smtClean="0">
-                <a:latin typeface="Consolas" panose="020B0609020204030204" pitchFamily="49" charset="0"/>
-                <a:ea typeface="Arial Unicode MS" pitchFamily="34" charset="-128"/>
-                <a:cs typeface="Arial Unicode MS" pitchFamily="34" charset="-128"/>
-              </a:rPr>
-              <a:t>" /&gt;</a:t>
-            </a:r>
-          </a:p>
-        </p:txBody>
+            <a:pPr lvl="0"/>
+            <a:r>
+              <a:rPr lang="en-US" dirty="0" smtClean="0"/>
+              <a:t>First level</a:t>
+            </a:r>
+          </a:p>
+          <a:p>
+            <a:pPr lvl="1"/>
+            <a:r>
+              <a:rPr lang="en-US" dirty="0" smtClean="0"/>
+              <a:t>Second level</a:t>
+            </a:r>
+          </a:p>
+          <a:p>
+            <a:pPr lvl="2"/>
+            <a:r>
+              <a:rPr lang="en-US" dirty="0" smtClean="0"/>
+              <a:t>Third level</a:t>
+            </a:r>
+          </a:p>
+          <a:p>
+            <a:endParaRPr lang="en-US" dirty="0"/>
+          </a:p>
+        </p:txBody>
+      </p:sp>
+      <p:sp>
+        <p:nvSpPr>
+          <p:cNvPr id="5" name="Picture Placeholder 4"/>
+          <p:cNvSpPr>
+            <a:spLocks noGrp="1"/>
+          </p:cNvSpPr>
+          <p:nvPr>
+            <p:ph type="pic" sz="quarter" idx="10"/>
+          </p:nvPr>
+        </p:nvSpPr>
+        <p:spPr/>
+      </p:sp>
+    </p:spTree>
+  </p:cSld>
+  <p:clrMapOvr>
+    <a:masterClrMapping/>
+  </p:clrMapOvr>
+  <p:transition spd="med"/>
+  <p:timing>
+    <p:tnLst>
+      <p:par>
+        <p:cTn id="1" dur="indefinite" restart="never" nodeType="tmRoot"/>
+      </p:par>
+    </p:tnLst>
+  </p:timing>
+</p:sld>
+</file>
+
+<file path=ppt/slides/slide8.xml><?xml version="1.0" encoding="utf-8"?>
+<p:sld xmlns:a="http://schemas.openxmlformats.org/drawingml/2006/main" xmlns:r="http://schemas.openxmlformats.org/officeDocument/2006/relationships" xmlns:p="http://schemas.openxmlformats.org/presentationml/2006/main" show="0">
+  <p:cSld>
+    <p:spTree>
+      <p:nvGrpSpPr>
+        <p:cNvPr id="1" name=""/>
+        <p:cNvGrpSpPr/>
+        <p:nvPr/>
+      </p:nvGrpSpPr>
+      <p:grpSpPr>
+        <a:xfrm>
+          <a:off x="0" y="0"/>
+          <a:ext cx="0" cy="0"/>
+          <a:chOff x="0" y="0"/>
+          <a:chExt cx="0" cy="0"/>
+        </a:xfrm>
+      </p:grpSpPr>
+      <p:sp>
+        <p:nvSpPr>
+          <p:cNvPr id="2" name="Title 1"/>
+          <p:cNvSpPr>
+            <a:spLocks noGrp="1"/>
+          </p:cNvSpPr>
+          <p:nvPr>
+            <p:ph type="title"/>
+          </p:nvPr>
+        </p:nvSpPr>
+        <p:spPr/>
+        <p:txBody>
+          <a:bodyPr/>
+          <a:lstStyle/>
+          <a:p>
+            <a:r>
+              <a:rPr lang="en-US" dirty="0" smtClean="0"/>
+              <a:t>Insert page title </a:t>
+            </a:r>
+            <a:endParaRPr lang="en-US" dirty="0"/>
+          </a:p>
+        </p:txBody>
+      </p:sp>
+      <p:sp>
+        <p:nvSpPr>
+          <p:cNvPr id="4" name="Text Placeholder 3"/>
+          <p:cNvSpPr>
+            <a:spLocks noGrp="1"/>
+          </p:cNvSpPr>
+          <p:nvPr>
+            <p:ph type="body" sz="quarter" idx="11"/>
+          </p:nvPr>
+        </p:nvSpPr>
+        <p:spPr/>
+        <p:txBody>
+          <a:bodyPr/>
+          <a:lstStyle/>
+          <a:p>
+            <a:pPr lvl="0"/>
+            <a:r>
+              <a:rPr lang="en-US" dirty="0" smtClean="0"/>
+              <a:t>First level</a:t>
+            </a:r>
+          </a:p>
+          <a:p>
+            <a:pPr lvl="1"/>
+            <a:r>
+              <a:rPr lang="en-US" dirty="0" smtClean="0"/>
+              <a:t>Second level</a:t>
+            </a:r>
+          </a:p>
+          <a:p>
+            <a:pPr lvl="2"/>
+            <a:r>
+              <a:rPr lang="en-US" dirty="0" smtClean="0"/>
+              <a:t>Third level</a:t>
+            </a:r>
+          </a:p>
+          <a:p>
+            <a:endParaRPr lang="en-US" dirty="0"/>
+          </a:p>
+        </p:txBody>
+      </p:sp>
+      <p:sp>
+        <p:nvSpPr>
+          <p:cNvPr id="5" name="Picture Placeholder 4"/>
+          <p:cNvSpPr>
+            <a:spLocks noGrp="1"/>
+          </p:cNvSpPr>
+          <p:nvPr>
+            <p:ph type="pic" sz="quarter" idx="10"/>
+          </p:nvPr>
+        </p:nvSpPr>
+        <p:spPr/>
       </p:sp>
     </p:spTree>
   </p:cSld>
@@ -11485,7 +11947,7 @@
 </file>
 
 <file path=ppt/slides/slide9.xml><?xml version="1.0" encoding="utf-8"?>
-<p:sld xmlns:a="http://schemas.openxmlformats.org/drawingml/2006/main" xmlns:r="http://schemas.openxmlformats.org/officeDocument/2006/relationships" xmlns:p="http://schemas.openxmlformats.org/presentationml/2006/main" show="0">
+<p:sld xmlns:a="http://schemas.openxmlformats.org/drawingml/2006/main" xmlns:r="http://schemas.openxmlformats.org/officeDocument/2006/relationships" xmlns:p="http://schemas.openxmlformats.org/presentationml/2006/main">
   <p:cSld>
     <p:spTree>
       <p:nvGrpSpPr>
@@ -11503,7 +11965,7 @@
       </p:grpSpPr>
       <p:sp>
         <p:nvSpPr>
-          <p:cNvPr id="2" name="Title 1"/>
+          <p:cNvPr id="24" name="Title 23"/>
           <p:cNvSpPr>
             <a:spLocks noGrp="1"/>
           </p:cNvSpPr>
@@ -11520,7 +11982,128 @@
               <a:rPr lang="en-US" dirty="0" smtClean="0"/>
               <a:t>Insert page title </a:t>
             </a:r>
-            <a:endParaRPr lang="en-US" dirty="0"/>
+            <a:endParaRPr lang="en-US" b="0" dirty="0"/>
+          </a:p>
+        </p:txBody>
+      </p:sp>
+      <p:sp>
+        <p:nvSpPr>
+          <p:cNvPr id="3" name="Text Placeholder 2"/>
+          <p:cNvSpPr>
+            <a:spLocks noGrp="1"/>
+          </p:cNvSpPr>
+          <p:nvPr>
+            <p:ph type="body" sz="quarter" idx="10"/>
+          </p:nvPr>
+        </p:nvSpPr>
+        <p:spPr/>
+        <p:txBody>
+          <a:bodyPr/>
+          <a:lstStyle/>
+          <a:p>
+            <a:r>
+              <a:rPr lang="en-US" dirty="0" smtClean="0"/>
+              <a:t>Headline here</a:t>
+            </a:r>
+          </a:p>
+          <a:p>
+            <a:pPr lvl="1"/>
+            <a:r>
+              <a:rPr lang="en-US" dirty="0" err="1" smtClean="0"/>
+              <a:t>Lorem</a:t>
+            </a:r>
+            <a:r>
+              <a:rPr lang="en-US" dirty="0" smtClean="0"/>
+              <a:t> </a:t>
+            </a:r>
+            <a:r>
+              <a:rPr lang="en-US" dirty="0" err="1" smtClean="0"/>
+              <a:t>ipsum</a:t>
+            </a:r>
+            <a:r>
+              <a:rPr lang="en-US" dirty="0" smtClean="0"/>
+              <a:t> dolor sit </a:t>
+            </a:r>
+            <a:r>
+              <a:rPr lang="en-US" dirty="0" err="1" smtClean="0"/>
+              <a:t>amet</a:t>
+            </a:r>
+            <a:r>
+              <a:rPr lang="en-US" dirty="0" smtClean="0"/>
+              <a:t>, </a:t>
+            </a:r>
+            <a:r>
+              <a:rPr lang="en-US" dirty="0" err="1" smtClean="0"/>
+              <a:t>consectetur</a:t>
+            </a:r>
+            <a:r>
+              <a:rPr lang="en-US" dirty="0" smtClean="0"/>
+              <a:t> </a:t>
+            </a:r>
+            <a:r>
+              <a:rPr lang="en-US" dirty="0" err="1" smtClean="0"/>
+              <a:t>adipiscing</a:t>
+            </a:r>
+            <a:r>
+              <a:rPr lang="en-US" dirty="0" smtClean="0"/>
+              <a:t> </a:t>
+            </a:r>
+            <a:r>
+              <a:rPr lang="en-US" dirty="0" err="1" smtClean="0"/>
+              <a:t>elit</a:t>
+            </a:r>
+            <a:r>
+              <a:rPr lang="en-US" dirty="0" smtClean="0"/>
+              <a:t>. Maecenas </a:t>
+            </a:r>
+            <a:r>
+              <a:rPr lang="en-US" dirty="0" err="1" smtClean="0"/>
+              <a:t>pellentesque</a:t>
+            </a:r>
+            <a:r>
+              <a:rPr lang="en-US" dirty="0" smtClean="0"/>
+              <a:t> </a:t>
+            </a:r>
+            <a:r>
+              <a:rPr lang="en-US" dirty="0" err="1" smtClean="0"/>
+              <a:t>laoreet</a:t>
+            </a:r>
+            <a:r>
+              <a:rPr lang="en-US" dirty="0" smtClean="0"/>
+              <a:t> </a:t>
+            </a:r>
+            <a:r>
+              <a:rPr lang="en-US" dirty="0" err="1" smtClean="0"/>
+              <a:t>urna</a:t>
+            </a:r>
+            <a:r>
+              <a:rPr lang="en-US" dirty="0" smtClean="0"/>
+              <a:t> </a:t>
+            </a:r>
+            <a:r>
+              <a:rPr lang="en-US" dirty="0" err="1" smtClean="0"/>
+              <a:t>molestie</a:t>
+            </a:r>
+            <a:r>
+              <a:rPr lang="en-US" dirty="0" smtClean="0"/>
+              <a:t> </a:t>
+            </a:r>
+            <a:r>
+              <a:rPr lang="en-US" dirty="0" err="1" smtClean="0"/>
+              <a:t>placerat</a:t>
+            </a:r>
+            <a:r>
+              <a:rPr lang="en-US" dirty="0" smtClean="0"/>
+              <a:t> </a:t>
+            </a:r>
+            <a:r>
+              <a:rPr lang="en-US" dirty="0" err="1" smtClean="0"/>
+              <a:t>ipsum</a:t>
+            </a:r>
+            <a:r>
+              <a:rPr lang="en-US" dirty="0" smtClean="0"/>
+              <a:t>.</a:t>
+            </a:r>
           </a:p>
         </p:txBody>
       </p:sp>
@@ -11531,7 +12114,7 @@
             <a:spLocks noGrp="1"/>
           </p:cNvSpPr>
           <p:nvPr>
-            <p:ph type="body" sz="quarter" idx="11"/>
+            <p:ph type="body" sz="quarter" idx="14"/>
           </p:nvPr>
         </p:nvSpPr>
         <p:spPr/>
@@ -11539,39 +12122,132 @@
           <a:bodyPr/>
           <a:lstStyle/>
           <a:p>
-            <a:pPr lvl="0"/>
-            <a:r>
-              <a:rPr lang="en-US" dirty="0" smtClean="0"/>
-              <a:t>First level</a:t>
+            <a:r>
+              <a:rPr lang="en-US" dirty="0" smtClean="0"/>
+              <a:t>Headline here</a:t>
             </a:r>
           </a:p>
           <a:p>
             <a:pPr lvl="1"/>
             <a:r>
-              <a:rPr lang="en-US" dirty="0" smtClean="0"/>
-              <a:t>Second level</a:t>
-            </a:r>
-          </a:p>
-          <a:p>
-            <a:pPr lvl="2"/>
-            <a:r>
-              <a:rPr lang="en-US" dirty="0" smtClean="0"/>
-              <a:t>Third level</a:t>
-            </a:r>
-          </a:p>
-          <a:p>
-            <a:endParaRPr lang="en-US" dirty="0"/>
-          </a:p>
-        </p:txBody>
-      </p:sp>
-      <p:sp>
-        <p:nvSpPr>
-          <p:cNvPr id="5" name="Picture Placeholder 4"/>
+              <a:rPr lang="en-US" dirty="0" err="1" smtClean="0"/>
+              <a:t>Lorem</a:t>
+            </a:r>
+            <a:r>
+              <a:rPr lang="en-US" dirty="0" smtClean="0"/>
+              <a:t> </a:t>
+            </a:r>
+            <a:r>
+              <a:rPr lang="en-US" dirty="0" err="1" smtClean="0"/>
+              <a:t>ipsum</a:t>
+            </a:r>
+            <a:r>
+              <a:rPr lang="en-US" dirty="0" smtClean="0"/>
+              <a:t> dolor sit </a:t>
+            </a:r>
+            <a:r>
+              <a:rPr lang="en-US" dirty="0" err="1" smtClean="0"/>
+              <a:t>amet</a:t>
+            </a:r>
+            <a:r>
+              <a:rPr lang="en-US" dirty="0" smtClean="0"/>
+              <a:t>, </a:t>
+            </a:r>
+            <a:r>
+              <a:rPr lang="en-US" dirty="0" err="1" smtClean="0"/>
+              <a:t>consectetur</a:t>
+            </a:r>
+            <a:r>
+              <a:rPr lang="en-US" dirty="0" smtClean="0"/>
+              <a:t> </a:t>
+            </a:r>
+            <a:r>
+              <a:rPr lang="en-US" dirty="0" err="1" smtClean="0"/>
+              <a:t>adipiscing</a:t>
+            </a:r>
+            <a:r>
+              <a:rPr lang="en-US" dirty="0" smtClean="0"/>
+              <a:t> </a:t>
+            </a:r>
+            <a:r>
+              <a:rPr lang="en-US" dirty="0" err="1" smtClean="0"/>
+              <a:t>elit</a:t>
+            </a:r>
+            <a:r>
+              <a:rPr lang="en-US" dirty="0" smtClean="0"/>
+              <a:t>. Maecenas </a:t>
+            </a:r>
+            <a:r>
+              <a:rPr lang="en-US" dirty="0" err="1" smtClean="0"/>
+              <a:t>pellentesque</a:t>
+            </a:r>
+            <a:r>
+              <a:rPr lang="en-US" dirty="0" smtClean="0"/>
+              <a:t> </a:t>
+            </a:r>
+            <a:r>
+              <a:rPr lang="en-US" dirty="0" err="1" smtClean="0"/>
+              <a:t>laoreet</a:t>
+            </a:r>
+            <a:r>
+              <a:rPr lang="en-US" dirty="0" smtClean="0"/>
+              <a:t> </a:t>
+            </a:r>
+            <a:r>
+              <a:rPr lang="en-US" dirty="0" err="1" smtClean="0"/>
+              <a:t>urna</a:t>
+            </a:r>
+            <a:r>
+              <a:rPr lang="en-US" dirty="0" smtClean="0"/>
+              <a:t> </a:t>
+            </a:r>
+            <a:r>
+              <a:rPr lang="en-US" dirty="0" err="1" smtClean="0"/>
+              <a:t>molestie</a:t>
+            </a:r>
+            <a:r>
+              <a:rPr lang="en-US" dirty="0" smtClean="0"/>
+              <a:t> </a:t>
+            </a:r>
+            <a:r>
+              <a:rPr lang="en-US" dirty="0" err="1" smtClean="0"/>
+              <a:t>placerat</a:t>
+            </a:r>
+            <a:r>
+              <a:rPr lang="en-US" dirty="0" smtClean="0"/>
+              <a:t> </a:t>
+            </a:r>
+            <a:r>
+              <a:rPr lang="en-US" dirty="0" err="1" smtClean="0"/>
+              <a:t>ipsum</a:t>
+            </a:r>
+            <a:r>
+              <a:rPr lang="en-US" dirty="0" smtClean="0"/>
+              <a:t>.</a:t>
+            </a:r>
+          </a:p>
+        </p:txBody>
+      </p:sp>
+      <p:sp>
+        <p:nvSpPr>
+          <p:cNvPr id="7" name="Picture Placeholder 6"/>
           <p:cNvSpPr>
             <a:spLocks noGrp="1"/>
           </p:cNvSpPr>
           <p:nvPr>
-            <p:ph type="pic" sz="quarter" idx="10"/>
+            <p:ph type="pic" sz="quarter" idx="15"/>
+          </p:nvPr>
+        </p:nvSpPr>
+        <p:spPr/>
+      </p:sp>
+      <p:sp>
+        <p:nvSpPr>
+          <p:cNvPr id="9" name="Picture Placeholder 8"/>
+          <p:cNvSpPr>
+            <a:spLocks noGrp="1"/>
+          </p:cNvSpPr>
+          <p:nvPr>
+            <p:ph type="pic" sz="quarter" idx="16"/>
           </p:nvPr>
         </p:nvSpPr>
         <p:spPr/>

</xml_diff>